<commit_message>
Updated Slide 14 with full code
</commit_message>
<xml_diff>
--- a/Presentation/Presentation.pptx
+++ b/Presentation/Presentation.pptx
@@ -230,7 +230,7 @@
           <a:p>
             <a:fld id="{E989E35C-41A2-6649-8445-C609160FB00D}" type="datetimeFigureOut">
               <a:rPr lang="en-US" smtClean="0"/>
-              <a:t>5/19/24</a:t>
+              <a:t>5/19/2024</a:t>
             </a:fld>
             <a:endParaRPr lang="en-US"/>
           </a:p>
@@ -519,7 +519,7 @@
           <p:cNvPr id="2" name="Title 1">
             <a:extLst>
               <a:ext uri="{FF2B5EF4-FFF2-40B4-BE49-F238E27FC236}">
-                <a16:creationId xmlns:a16="http://schemas.microsoft.com/office/drawing/2014/main" xmlns="" id="{77F83D70-91AA-429A-BD57-1CB6792B30EE}"/>
+                <a16:creationId xmlns:a16="http://schemas.microsoft.com/office/drawing/2014/main" id="{77F83D70-91AA-429A-BD57-1CB6792B30EE}"/>
               </a:ext>
             </a:extLst>
           </p:cNvPr>
@@ -558,7 +558,7 @@
           <p:cNvPr id="3" name="Subtitle 2">
             <a:extLst>
               <a:ext uri="{FF2B5EF4-FFF2-40B4-BE49-F238E27FC236}">
-                <a16:creationId xmlns:a16="http://schemas.microsoft.com/office/drawing/2014/main" xmlns="" id="{F065D245-B564-481D-A323-F73C5BCA8461}"/>
+                <a16:creationId xmlns:a16="http://schemas.microsoft.com/office/drawing/2014/main" id="{F065D245-B564-481D-A323-F73C5BCA8461}"/>
               </a:ext>
             </a:extLst>
           </p:cNvPr>
@@ -633,7 +633,7 @@
           <p:cNvPr id="4" name="Date Placeholder 3">
             <a:extLst>
               <a:ext uri="{FF2B5EF4-FFF2-40B4-BE49-F238E27FC236}">
-                <a16:creationId xmlns:a16="http://schemas.microsoft.com/office/drawing/2014/main" xmlns="" id="{28E072EE-51B3-4C0C-A460-4684AB079301}"/>
+                <a16:creationId xmlns:a16="http://schemas.microsoft.com/office/drawing/2014/main" id="{28E072EE-51B3-4C0C-A460-4684AB079301}"/>
               </a:ext>
             </a:extLst>
           </p:cNvPr>
@@ -651,7 +651,7 @@
           <a:p>
             <a:fld id="{A1E45834-53BD-4C8F-B791-CD5378F4150E}" type="datetimeFigureOut">
               <a:rPr lang="en-US" smtClean="0"/>
-              <a:t>5/19/24</a:t>
+              <a:t>5/19/2024</a:t>
             </a:fld>
             <a:endParaRPr lang="en-US"/>
           </a:p>
@@ -662,7 +662,7 @@
           <p:cNvPr id="5" name="Footer Placeholder 4">
             <a:extLst>
               <a:ext uri="{FF2B5EF4-FFF2-40B4-BE49-F238E27FC236}">
-                <a16:creationId xmlns:a16="http://schemas.microsoft.com/office/drawing/2014/main" xmlns="" id="{011422A5-3076-413B-84CB-ED3BA4171CC0}"/>
+                <a16:creationId xmlns:a16="http://schemas.microsoft.com/office/drawing/2014/main" id="{011422A5-3076-413B-84CB-ED3BA4171CC0}"/>
               </a:ext>
             </a:extLst>
           </p:cNvPr>
@@ -687,7 +687,7 @@
           <p:cNvPr id="6" name="Slide Number Placeholder 5">
             <a:extLst>
               <a:ext uri="{FF2B5EF4-FFF2-40B4-BE49-F238E27FC236}">
-                <a16:creationId xmlns:a16="http://schemas.microsoft.com/office/drawing/2014/main" xmlns="" id="{F5267C68-40D5-477E-9DBC-C28FD4B1142F}"/>
+                <a16:creationId xmlns:a16="http://schemas.microsoft.com/office/drawing/2014/main" id="{F5267C68-40D5-477E-9DBC-C28FD4B1142F}"/>
               </a:ext>
             </a:extLst>
           </p:cNvPr>
@@ -746,7 +746,7 @@
           <p:cNvPr id="2" name="Title 1">
             <a:extLst>
               <a:ext uri="{FF2B5EF4-FFF2-40B4-BE49-F238E27FC236}">
-                <a16:creationId xmlns:a16="http://schemas.microsoft.com/office/drawing/2014/main" xmlns="" id="{8DD6C900-05BC-4021-B69F-2DAF974B7EF6}"/>
+                <a16:creationId xmlns:a16="http://schemas.microsoft.com/office/drawing/2014/main" id="{8DD6C900-05BC-4021-B69F-2DAF974B7EF6}"/>
               </a:ext>
             </a:extLst>
           </p:cNvPr>
@@ -774,7 +774,7 @@
           <p:cNvPr id="3" name="Vertical Text Placeholder 2">
             <a:extLst>
               <a:ext uri="{FF2B5EF4-FFF2-40B4-BE49-F238E27FC236}">
-                <a16:creationId xmlns:a16="http://schemas.microsoft.com/office/drawing/2014/main" xmlns="" id="{3F26E227-253A-44A0-9404-1CFD8CE419CC}"/>
+                <a16:creationId xmlns:a16="http://schemas.microsoft.com/office/drawing/2014/main" id="{3F26E227-253A-44A0-9404-1CFD8CE419CC}"/>
               </a:ext>
             </a:extLst>
           </p:cNvPr>
@@ -831,7 +831,7 @@
           <p:cNvPr id="4" name="Date Placeholder 3">
             <a:extLst>
               <a:ext uri="{FF2B5EF4-FFF2-40B4-BE49-F238E27FC236}">
-                <a16:creationId xmlns:a16="http://schemas.microsoft.com/office/drawing/2014/main" xmlns="" id="{9AFF5A02-0FC4-41C8-A13C-4C929B28846B}"/>
+                <a16:creationId xmlns:a16="http://schemas.microsoft.com/office/drawing/2014/main" id="{9AFF5A02-0FC4-41C8-A13C-4C929B28846B}"/>
               </a:ext>
             </a:extLst>
           </p:cNvPr>
@@ -849,7 +849,7 @@
           <a:p>
             <a:fld id="{A1E45834-53BD-4C8F-B791-CD5378F4150E}" type="datetimeFigureOut">
               <a:rPr lang="en-US" smtClean="0"/>
-              <a:t>5/19/24</a:t>
+              <a:t>5/19/2024</a:t>
             </a:fld>
             <a:endParaRPr lang="en-US"/>
           </a:p>
@@ -860,7 +860,7 @@
           <p:cNvPr id="5" name="Footer Placeholder 4">
             <a:extLst>
               <a:ext uri="{FF2B5EF4-FFF2-40B4-BE49-F238E27FC236}">
-                <a16:creationId xmlns:a16="http://schemas.microsoft.com/office/drawing/2014/main" xmlns="" id="{80459378-C430-49DB-B2D6-E32FBBCD4A6F}"/>
+                <a16:creationId xmlns:a16="http://schemas.microsoft.com/office/drawing/2014/main" id="{80459378-C430-49DB-B2D6-E32FBBCD4A6F}"/>
               </a:ext>
             </a:extLst>
           </p:cNvPr>
@@ -885,7 +885,7 @@
           <p:cNvPr id="6" name="Slide Number Placeholder 5">
             <a:extLst>
               <a:ext uri="{FF2B5EF4-FFF2-40B4-BE49-F238E27FC236}">
-                <a16:creationId xmlns:a16="http://schemas.microsoft.com/office/drawing/2014/main" xmlns="" id="{E7B9D57D-CB8E-4E67-AE2D-2790E2AA60CB}"/>
+                <a16:creationId xmlns:a16="http://schemas.microsoft.com/office/drawing/2014/main" id="{E7B9D57D-CB8E-4E67-AE2D-2790E2AA60CB}"/>
               </a:ext>
             </a:extLst>
           </p:cNvPr>
@@ -944,7 +944,7 @@
           <p:cNvPr id="2" name="Vertical Title 1">
             <a:extLst>
               <a:ext uri="{FF2B5EF4-FFF2-40B4-BE49-F238E27FC236}">
-                <a16:creationId xmlns:a16="http://schemas.microsoft.com/office/drawing/2014/main" xmlns="" id="{E82CF945-D70F-49C1-8CE5-5758C1166014}"/>
+                <a16:creationId xmlns:a16="http://schemas.microsoft.com/office/drawing/2014/main" id="{E82CF945-D70F-49C1-8CE5-5758C1166014}"/>
               </a:ext>
             </a:extLst>
           </p:cNvPr>
@@ -977,7 +977,7 @@
           <p:cNvPr id="3" name="Vertical Text Placeholder 2">
             <a:extLst>
               <a:ext uri="{FF2B5EF4-FFF2-40B4-BE49-F238E27FC236}">
-                <a16:creationId xmlns:a16="http://schemas.microsoft.com/office/drawing/2014/main" xmlns="" id="{C2FDB721-04AA-4330-8045-3F2D9BB4BC66}"/>
+                <a16:creationId xmlns:a16="http://schemas.microsoft.com/office/drawing/2014/main" id="{C2FDB721-04AA-4330-8045-3F2D9BB4BC66}"/>
               </a:ext>
             </a:extLst>
           </p:cNvPr>
@@ -1039,7 +1039,7 @@
           <p:cNvPr id="4" name="Date Placeholder 3">
             <a:extLst>
               <a:ext uri="{FF2B5EF4-FFF2-40B4-BE49-F238E27FC236}">
-                <a16:creationId xmlns:a16="http://schemas.microsoft.com/office/drawing/2014/main" xmlns="" id="{0F418C15-991C-4C71-8DCD-DB3B3888831F}"/>
+                <a16:creationId xmlns:a16="http://schemas.microsoft.com/office/drawing/2014/main" id="{0F418C15-991C-4C71-8DCD-DB3B3888831F}"/>
               </a:ext>
             </a:extLst>
           </p:cNvPr>
@@ -1057,7 +1057,7 @@
           <a:p>
             <a:fld id="{A1E45834-53BD-4C8F-B791-CD5378F4150E}" type="datetimeFigureOut">
               <a:rPr lang="en-US" smtClean="0"/>
-              <a:t>5/19/24</a:t>
+              <a:t>5/19/2024</a:t>
             </a:fld>
             <a:endParaRPr lang="en-US"/>
           </a:p>
@@ -1068,7 +1068,7 @@
           <p:cNvPr id="5" name="Footer Placeholder 4">
             <a:extLst>
               <a:ext uri="{FF2B5EF4-FFF2-40B4-BE49-F238E27FC236}">
-                <a16:creationId xmlns:a16="http://schemas.microsoft.com/office/drawing/2014/main" xmlns="" id="{F7728CC3-5830-4EFA-B28E-1648904DE189}"/>
+                <a16:creationId xmlns:a16="http://schemas.microsoft.com/office/drawing/2014/main" id="{F7728CC3-5830-4EFA-B28E-1648904DE189}"/>
               </a:ext>
             </a:extLst>
           </p:cNvPr>
@@ -1093,7 +1093,7 @@
           <p:cNvPr id="6" name="Slide Number Placeholder 5">
             <a:extLst>
               <a:ext uri="{FF2B5EF4-FFF2-40B4-BE49-F238E27FC236}">
-                <a16:creationId xmlns:a16="http://schemas.microsoft.com/office/drawing/2014/main" xmlns="" id="{FCDA91B6-E419-4483-9B66-3C758788BC48}"/>
+                <a16:creationId xmlns:a16="http://schemas.microsoft.com/office/drawing/2014/main" id="{FCDA91B6-E419-4483-9B66-3C758788BC48}"/>
               </a:ext>
             </a:extLst>
           </p:cNvPr>
@@ -1122,7 +1122,7 @@
           <p:cNvPr id="7" name="Straight Connector 6">
             <a:extLst>
               <a:ext uri="{FF2B5EF4-FFF2-40B4-BE49-F238E27FC236}">
-                <a16:creationId xmlns:a16="http://schemas.microsoft.com/office/drawing/2014/main" xmlns="" id="{DE447C6A-78C3-4687-9A71-A05DBF6700DE}"/>
+                <a16:creationId xmlns:a16="http://schemas.microsoft.com/office/drawing/2014/main" id="{DE447C6A-78C3-4687-9A71-A05DBF6700DE}"/>
               </a:ext>
             </a:extLst>
           </p:cNvPr>
@@ -1195,7 +1195,7 @@
           <p:cNvPr id="2" name="Title 1">
             <a:extLst>
               <a:ext uri="{FF2B5EF4-FFF2-40B4-BE49-F238E27FC236}">
-                <a16:creationId xmlns:a16="http://schemas.microsoft.com/office/drawing/2014/main" xmlns="" id="{7C3EE2F5-9D3C-4BE7-9AD5-335B31CF2CB5}"/>
+                <a16:creationId xmlns:a16="http://schemas.microsoft.com/office/drawing/2014/main" id="{7C3EE2F5-9D3C-4BE7-9AD5-335B31CF2CB5}"/>
               </a:ext>
             </a:extLst>
           </p:cNvPr>
@@ -1223,7 +1223,7 @@
           <p:cNvPr id="3" name="Content Placeholder 2">
             <a:extLst>
               <a:ext uri="{FF2B5EF4-FFF2-40B4-BE49-F238E27FC236}">
-                <a16:creationId xmlns:a16="http://schemas.microsoft.com/office/drawing/2014/main" xmlns="" id="{E5F98C4F-4BF6-47CF-ABEE-2B12748C470C}"/>
+                <a16:creationId xmlns:a16="http://schemas.microsoft.com/office/drawing/2014/main" id="{E5F98C4F-4BF6-47CF-ABEE-2B12748C470C}"/>
               </a:ext>
             </a:extLst>
           </p:cNvPr>
@@ -1280,7 +1280,7 @@
           <p:cNvPr id="4" name="Date Placeholder 3">
             <a:extLst>
               <a:ext uri="{FF2B5EF4-FFF2-40B4-BE49-F238E27FC236}">
-                <a16:creationId xmlns:a16="http://schemas.microsoft.com/office/drawing/2014/main" xmlns="" id="{0D539070-70D2-4DD1-A439-155343FE262E}"/>
+                <a16:creationId xmlns:a16="http://schemas.microsoft.com/office/drawing/2014/main" id="{0D539070-70D2-4DD1-A439-155343FE262E}"/>
               </a:ext>
             </a:extLst>
           </p:cNvPr>
@@ -1298,7 +1298,7 @@
           <a:p>
             <a:fld id="{A1E45834-53BD-4C8F-B791-CD5378F4150E}" type="datetimeFigureOut">
               <a:rPr lang="en-US" smtClean="0"/>
-              <a:t>5/19/24</a:t>
+              <a:t>5/19/2024</a:t>
             </a:fld>
             <a:endParaRPr lang="en-US"/>
           </a:p>
@@ -1309,7 +1309,7 @@
           <p:cNvPr id="5" name="Footer Placeholder 4">
             <a:extLst>
               <a:ext uri="{FF2B5EF4-FFF2-40B4-BE49-F238E27FC236}">
-                <a16:creationId xmlns:a16="http://schemas.microsoft.com/office/drawing/2014/main" xmlns="" id="{6151AB30-CD74-471D-9FA6-ADC0C901E6D0}"/>
+                <a16:creationId xmlns:a16="http://schemas.microsoft.com/office/drawing/2014/main" id="{6151AB30-CD74-471D-9FA6-ADC0C901E6D0}"/>
               </a:ext>
             </a:extLst>
           </p:cNvPr>
@@ -1334,7 +1334,7 @@
           <p:cNvPr id="6" name="Slide Number Placeholder 5">
             <a:extLst>
               <a:ext uri="{FF2B5EF4-FFF2-40B4-BE49-F238E27FC236}">
-                <a16:creationId xmlns:a16="http://schemas.microsoft.com/office/drawing/2014/main" xmlns="" id="{A6A137C4-F19E-4521-8DCB-4E0CF9CA3193}"/>
+                <a16:creationId xmlns:a16="http://schemas.microsoft.com/office/drawing/2014/main" id="{A6A137C4-F19E-4521-8DCB-4E0CF9CA3193}"/>
               </a:ext>
             </a:extLst>
           </p:cNvPr>
@@ -1393,7 +1393,7 @@
           <p:cNvPr id="2" name="Title 1">
             <a:extLst>
               <a:ext uri="{FF2B5EF4-FFF2-40B4-BE49-F238E27FC236}">
-                <a16:creationId xmlns:a16="http://schemas.microsoft.com/office/drawing/2014/main" xmlns="" id="{5748007D-9B1D-4E2C-B38F-29C6820996DF}"/>
+                <a16:creationId xmlns:a16="http://schemas.microsoft.com/office/drawing/2014/main" id="{5748007D-9B1D-4E2C-B38F-29C6820996DF}"/>
               </a:ext>
             </a:extLst>
           </p:cNvPr>
@@ -1433,7 +1433,7 @@
           <p:cNvPr id="3" name="Text Placeholder 2">
             <a:extLst>
               <a:ext uri="{FF2B5EF4-FFF2-40B4-BE49-F238E27FC236}">
-                <a16:creationId xmlns:a16="http://schemas.microsoft.com/office/drawing/2014/main" xmlns="" id="{5960C51B-B525-4032-9D08-2978D7367BFF}"/>
+                <a16:creationId xmlns:a16="http://schemas.microsoft.com/office/drawing/2014/main" id="{5960C51B-B525-4032-9D08-2978D7367BFF}"/>
               </a:ext>
             </a:extLst>
           </p:cNvPr>
@@ -1558,7 +1558,7 @@
           <p:cNvPr id="4" name="Date Placeholder 3">
             <a:extLst>
               <a:ext uri="{FF2B5EF4-FFF2-40B4-BE49-F238E27FC236}">
-                <a16:creationId xmlns:a16="http://schemas.microsoft.com/office/drawing/2014/main" xmlns="" id="{B3408851-4DCC-447C-828A-5F7E66F7623D}"/>
+                <a16:creationId xmlns:a16="http://schemas.microsoft.com/office/drawing/2014/main" id="{B3408851-4DCC-447C-828A-5F7E66F7623D}"/>
               </a:ext>
             </a:extLst>
           </p:cNvPr>
@@ -1576,7 +1576,7 @@
           <a:p>
             <a:fld id="{A1E45834-53BD-4C8F-B791-CD5378F4150E}" type="datetimeFigureOut">
               <a:rPr lang="en-US" smtClean="0"/>
-              <a:t>5/19/24</a:t>
+              <a:t>5/19/2024</a:t>
             </a:fld>
             <a:endParaRPr lang="en-US"/>
           </a:p>
@@ -1587,7 +1587,7 @@
           <p:cNvPr id="5" name="Footer Placeholder 4">
             <a:extLst>
               <a:ext uri="{FF2B5EF4-FFF2-40B4-BE49-F238E27FC236}">
-                <a16:creationId xmlns:a16="http://schemas.microsoft.com/office/drawing/2014/main" xmlns="" id="{4C094542-CAEF-4D6C-BE6A-BC100F0590F9}"/>
+                <a16:creationId xmlns:a16="http://schemas.microsoft.com/office/drawing/2014/main" id="{4C094542-CAEF-4D6C-BE6A-BC100F0590F9}"/>
               </a:ext>
             </a:extLst>
           </p:cNvPr>
@@ -1612,7 +1612,7 @@
           <p:cNvPr id="6" name="Slide Number Placeholder 5">
             <a:extLst>
               <a:ext uri="{FF2B5EF4-FFF2-40B4-BE49-F238E27FC236}">
-                <a16:creationId xmlns:a16="http://schemas.microsoft.com/office/drawing/2014/main" xmlns="" id="{2C8BDE40-8468-4051-9703-B751608AAF9D}"/>
+                <a16:creationId xmlns:a16="http://schemas.microsoft.com/office/drawing/2014/main" id="{2C8BDE40-8468-4051-9703-B751608AAF9D}"/>
               </a:ext>
             </a:extLst>
           </p:cNvPr>
@@ -1671,7 +1671,7 @@
           <p:cNvPr id="2" name="Title 1">
             <a:extLst>
               <a:ext uri="{FF2B5EF4-FFF2-40B4-BE49-F238E27FC236}">
-                <a16:creationId xmlns:a16="http://schemas.microsoft.com/office/drawing/2014/main" xmlns="" id="{8F6BF7AE-3892-4896-8C15-7A35A41EFD9C}"/>
+                <a16:creationId xmlns:a16="http://schemas.microsoft.com/office/drawing/2014/main" id="{8F6BF7AE-3892-4896-8C15-7A35A41EFD9C}"/>
               </a:ext>
             </a:extLst>
           </p:cNvPr>
@@ -1704,7 +1704,7 @@
           <p:cNvPr id="3" name="Content Placeholder 2">
             <a:extLst>
               <a:ext uri="{FF2B5EF4-FFF2-40B4-BE49-F238E27FC236}">
-                <a16:creationId xmlns:a16="http://schemas.microsoft.com/office/drawing/2014/main" xmlns="" id="{F2FD9A26-86F1-4817-B243-4DE63B4F182F}"/>
+                <a16:creationId xmlns:a16="http://schemas.microsoft.com/office/drawing/2014/main" id="{F2FD9A26-86F1-4817-B243-4DE63B4F182F}"/>
               </a:ext>
             </a:extLst>
           </p:cNvPr>
@@ -1766,7 +1766,7 @@
           <p:cNvPr id="4" name="Content Placeholder 3">
             <a:extLst>
               <a:ext uri="{FF2B5EF4-FFF2-40B4-BE49-F238E27FC236}">
-                <a16:creationId xmlns:a16="http://schemas.microsoft.com/office/drawing/2014/main" xmlns="" id="{D454BF9B-EA16-48C8-96B9-7A66051BE768}"/>
+                <a16:creationId xmlns:a16="http://schemas.microsoft.com/office/drawing/2014/main" id="{D454BF9B-EA16-48C8-96B9-7A66051BE768}"/>
               </a:ext>
             </a:extLst>
           </p:cNvPr>
@@ -1828,7 +1828,7 @@
           <p:cNvPr id="5" name="Date Placeholder 4">
             <a:extLst>
               <a:ext uri="{FF2B5EF4-FFF2-40B4-BE49-F238E27FC236}">
-                <a16:creationId xmlns:a16="http://schemas.microsoft.com/office/drawing/2014/main" xmlns="" id="{D16E2D9F-1FCE-4A1C-996E-DB05777A8994}"/>
+                <a16:creationId xmlns:a16="http://schemas.microsoft.com/office/drawing/2014/main" id="{D16E2D9F-1FCE-4A1C-996E-DB05777A8994}"/>
               </a:ext>
             </a:extLst>
           </p:cNvPr>
@@ -1846,7 +1846,7 @@
           <a:p>
             <a:fld id="{A1E45834-53BD-4C8F-B791-CD5378F4150E}" type="datetimeFigureOut">
               <a:rPr lang="en-US" smtClean="0"/>
-              <a:t>5/19/24</a:t>
+              <a:t>5/19/2024</a:t>
             </a:fld>
             <a:endParaRPr lang="en-US"/>
           </a:p>
@@ -1857,7 +1857,7 @@
           <p:cNvPr id="6" name="Footer Placeholder 5">
             <a:extLst>
               <a:ext uri="{FF2B5EF4-FFF2-40B4-BE49-F238E27FC236}">
-                <a16:creationId xmlns:a16="http://schemas.microsoft.com/office/drawing/2014/main" xmlns="" id="{40629E05-3F6C-40BF-9324-118588B6CAE6}"/>
+                <a16:creationId xmlns:a16="http://schemas.microsoft.com/office/drawing/2014/main" id="{40629E05-3F6C-40BF-9324-118588B6CAE6}"/>
               </a:ext>
             </a:extLst>
           </p:cNvPr>
@@ -1882,7 +1882,7 @@
           <p:cNvPr id="7" name="Slide Number Placeholder 6">
             <a:extLst>
               <a:ext uri="{FF2B5EF4-FFF2-40B4-BE49-F238E27FC236}">
-                <a16:creationId xmlns:a16="http://schemas.microsoft.com/office/drawing/2014/main" xmlns="" id="{069BE013-C5C0-4CBD-982E-36F037F7366F}"/>
+                <a16:creationId xmlns:a16="http://schemas.microsoft.com/office/drawing/2014/main" id="{069BE013-C5C0-4CBD-982E-36F037F7366F}"/>
               </a:ext>
             </a:extLst>
           </p:cNvPr>
@@ -1941,7 +1941,7 @@
           <p:cNvPr id="2" name="Title 1">
             <a:extLst>
               <a:ext uri="{FF2B5EF4-FFF2-40B4-BE49-F238E27FC236}">
-                <a16:creationId xmlns:a16="http://schemas.microsoft.com/office/drawing/2014/main" xmlns="" id="{E8BED885-5FE5-4407-BE4D-FAD01C40A905}"/>
+                <a16:creationId xmlns:a16="http://schemas.microsoft.com/office/drawing/2014/main" id="{E8BED885-5FE5-4407-BE4D-FAD01C40A905}"/>
               </a:ext>
             </a:extLst>
           </p:cNvPr>
@@ -1974,7 +1974,7 @@
           <p:cNvPr id="3" name="Text Placeholder 2">
             <a:extLst>
               <a:ext uri="{FF2B5EF4-FFF2-40B4-BE49-F238E27FC236}">
-                <a16:creationId xmlns:a16="http://schemas.microsoft.com/office/drawing/2014/main" xmlns="" id="{6E322A77-C134-4857-83E5-51217D3C29FB}"/>
+                <a16:creationId xmlns:a16="http://schemas.microsoft.com/office/drawing/2014/main" id="{6E322A77-C134-4857-83E5-51217D3C29FB}"/>
               </a:ext>
             </a:extLst>
           </p:cNvPr>
@@ -2050,7 +2050,7 @@
           <p:cNvPr id="4" name="Content Placeholder 3">
             <a:extLst>
               <a:ext uri="{FF2B5EF4-FFF2-40B4-BE49-F238E27FC236}">
-                <a16:creationId xmlns:a16="http://schemas.microsoft.com/office/drawing/2014/main" xmlns="" id="{9A4ECBFE-C62C-471B-BFE4-1272EAC3479D}"/>
+                <a16:creationId xmlns:a16="http://schemas.microsoft.com/office/drawing/2014/main" id="{9A4ECBFE-C62C-471B-BFE4-1272EAC3479D}"/>
               </a:ext>
             </a:extLst>
           </p:cNvPr>
@@ -2112,7 +2112,7 @@
           <p:cNvPr id="5" name="Text Placeholder 4">
             <a:extLst>
               <a:ext uri="{FF2B5EF4-FFF2-40B4-BE49-F238E27FC236}">
-                <a16:creationId xmlns:a16="http://schemas.microsoft.com/office/drawing/2014/main" xmlns="" id="{7710AFC6-F407-4F35-BD37-B32F9B4036D0}"/>
+                <a16:creationId xmlns:a16="http://schemas.microsoft.com/office/drawing/2014/main" id="{7710AFC6-F407-4F35-BD37-B32F9B4036D0}"/>
               </a:ext>
             </a:extLst>
           </p:cNvPr>
@@ -2188,7 +2188,7 @@
           <p:cNvPr id="6" name="Content Placeholder 5">
             <a:extLst>
               <a:ext uri="{FF2B5EF4-FFF2-40B4-BE49-F238E27FC236}">
-                <a16:creationId xmlns:a16="http://schemas.microsoft.com/office/drawing/2014/main" xmlns="" id="{458D60D5-0F83-46CB-92F3-849FC08E6E92}"/>
+                <a16:creationId xmlns:a16="http://schemas.microsoft.com/office/drawing/2014/main" id="{458D60D5-0F83-46CB-92F3-849FC08E6E92}"/>
               </a:ext>
             </a:extLst>
           </p:cNvPr>
@@ -2250,7 +2250,7 @@
           <p:cNvPr id="7" name="Date Placeholder 6">
             <a:extLst>
               <a:ext uri="{FF2B5EF4-FFF2-40B4-BE49-F238E27FC236}">
-                <a16:creationId xmlns:a16="http://schemas.microsoft.com/office/drawing/2014/main" xmlns="" id="{AA5AE694-5CA0-48DA-90D3-EC42BD1D86C1}"/>
+                <a16:creationId xmlns:a16="http://schemas.microsoft.com/office/drawing/2014/main" id="{AA5AE694-5CA0-48DA-90D3-EC42BD1D86C1}"/>
               </a:ext>
             </a:extLst>
           </p:cNvPr>
@@ -2268,7 +2268,7 @@
           <a:p>
             <a:fld id="{A1E45834-53BD-4C8F-B791-CD5378F4150E}" type="datetimeFigureOut">
               <a:rPr lang="en-US" smtClean="0"/>
-              <a:t>5/19/24</a:t>
+              <a:t>5/19/2024</a:t>
             </a:fld>
             <a:endParaRPr lang="en-US"/>
           </a:p>
@@ -2279,7 +2279,7 @@
           <p:cNvPr id="8" name="Footer Placeholder 7">
             <a:extLst>
               <a:ext uri="{FF2B5EF4-FFF2-40B4-BE49-F238E27FC236}">
-                <a16:creationId xmlns:a16="http://schemas.microsoft.com/office/drawing/2014/main" xmlns="" id="{F340A80D-4CCB-4899-9E1D-A5967F4E649A}"/>
+                <a16:creationId xmlns:a16="http://schemas.microsoft.com/office/drawing/2014/main" id="{F340A80D-4CCB-4899-9E1D-A5967F4E649A}"/>
               </a:ext>
             </a:extLst>
           </p:cNvPr>
@@ -2304,7 +2304,7 @@
           <p:cNvPr id="9" name="Slide Number Placeholder 8">
             <a:extLst>
               <a:ext uri="{FF2B5EF4-FFF2-40B4-BE49-F238E27FC236}">
-                <a16:creationId xmlns:a16="http://schemas.microsoft.com/office/drawing/2014/main" xmlns="" id="{4F753A9D-469A-4ED9-99A1-7E4B115F8933}"/>
+                <a16:creationId xmlns:a16="http://schemas.microsoft.com/office/drawing/2014/main" id="{4F753A9D-469A-4ED9-99A1-7E4B115F8933}"/>
               </a:ext>
             </a:extLst>
           </p:cNvPr>
@@ -2363,7 +2363,7 @@
           <p:cNvPr id="2" name="Title 1">
             <a:extLst>
               <a:ext uri="{FF2B5EF4-FFF2-40B4-BE49-F238E27FC236}">
-                <a16:creationId xmlns:a16="http://schemas.microsoft.com/office/drawing/2014/main" xmlns="" id="{4E87C91E-0A11-4E5D-9B8D-5316E73A2D58}"/>
+                <a16:creationId xmlns:a16="http://schemas.microsoft.com/office/drawing/2014/main" id="{4E87C91E-0A11-4E5D-9B8D-5316E73A2D58}"/>
               </a:ext>
             </a:extLst>
           </p:cNvPr>
@@ -2395,7 +2395,7 @@
           <p:cNvPr id="3" name="Date Placeholder 2">
             <a:extLst>
               <a:ext uri="{FF2B5EF4-FFF2-40B4-BE49-F238E27FC236}">
-                <a16:creationId xmlns:a16="http://schemas.microsoft.com/office/drawing/2014/main" xmlns="" id="{A1B8A8D1-71AD-4F9F-B393-9EED83FEF003}"/>
+                <a16:creationId xmlns:a16="http://schemas.microsoft.com/office/drawing/2014/main" id="{A1B8A8D1-71AD-4F9F-B393-9EED83FEF003}"/>
               </a:ext>
             </a:extLst>
           </p:cNvPr>
@@ -2413,7 +2413,7 @@
           <a:p>
             <a:fld id="{A1E45834-53BD-4C8F-B791-CD5378F4150E}" type="datetimeFigureOut">
               <a:rPr lang="en-US" smtClean="0"/>
-              <a:t>5/19/24</a:t>
+              <a:t>5/19/2024</a:t>
             </a:fld>
             <a:endParaRPr lang="en-US"/>
           </a:p>
@@ -2424,7 +2424,7 @@
           <p:cNvPr id="4" name="Footer Placeholder 3">
             <a:extLst>
               <a:ext uri="{FF2B5EF4-FFF2-40B4-BE49-F238E27FC236}">
-                <a16:creationId xmlns:a16="http://schemas.microsoft.com/office/drawing/2014/main" xmlns="" id="{D7E36922-9A4C-453D-9B70-0C3A70281C03}"/>
+                <a16:creationId xmlns:a16="http://schemas.microsoft.com/office/drawing/2014/main" id="{D7E36922-9A4C-453D-9B70-0C3A70281C03}"/>
               </a:ext>
             </a:extLst>
           </p:cNvPr>
@@ -2449,7 +2449,7 @@
           <p:cNvPr id="5" name="Slide Number Placeholder 4">
             <a:extLst>
               <a:ext uri="{FF2B5EF4-FFF2-40B4-BE49-F238E27FC236}">
-                <a16:creationId xmlns:a16="http://schemas.microsoft.com/office/drawing/2014/main" xmlns="" id="{EF5AAEF2-65DC-4E28-9AA4-5115ACB074CC}"/>
+                <a16:creationId xmlns:a16="http://schemas.microsoft.com/office/drawing/2014/main" id="{EF5AAEF2-65DC-4E28-9AA4-5115ACB074CC}"/>
               </a:ext>
             </a:extLst>
           </p:cNvPr>
@@ -2508,7 +2508,7 @@
           <p:cNvPr id="2" name="Date Placeholder 1">
             <a:extLst>
               <a:ext uri="{FF2B5EF4-FFF2-40B4-BE49-F238E27FC236}">
-                <a16:creationId xmlns:a16="http://schemas.microsoft.com/office/drawing/2014/main" xmlns="" id="{D448B02B-A32A-4383-BBC7-0C383390A96F}"/>
+                <a16:creationId xmlns:a16="http://schemas.microsoft.com/office/drawing/2014/main" id="{D448B02B-A32A-4383-BBC7-0C383390A96F}"/>
               </a:ext>
             </a:extLst>
           </p:cNvPr>
@@ -2526,7 +2526,7 @@
           <a:p>
             <a:fld id="{A1E45834-53BD-4C8F-B791-CD5378F4150E}" type="datetimeFigureOut">
               <a:rPr lang="en-US" smtClean="0"/>
-              <a:t>5/19/24</a:t>
+              <a:t>5/19/2024</a:t>
             </a:fld>
             <a:endParaRPr lang="en-US"/>
           </a:p>
@@ -2537,7 +2537,7 @@
           <p:cNvPr id="3" name="Footer Placeholder 2">
             <a:extLst>
               <a:ext uri="{FF2B5EF4-FFF2-40B4-BE49-F238E27FC236}">
-                <a16:creationId xmlns:a16="http://schemas.microsoft.com/office/drawing/2014/main" xmlns="" id="{FCFF7E77-47E0-4F9E-9148-8D0C59C0CFCE}"/>
+                <a16:creationId xmlns:a16="http://schemas.microsoft.com/office/drawing/2014/main" id="{FCFF7E77-47E0-4F9E-9148-8D0C59C0CFCE}"/>
               </a:ext>
             </a:extLst>
           </p:cNvPr>
@@ -2562,7 +2562,7 @@
           <p:cNvPr id="4" name="Slide Number Placeholder 3">
             <a:extLst>
               <a:ext uri="{FF2B5EF4-FFF2-40B4-BE49-F238E27FC236}">
-                <a16:creationId xmlns:a16="http://schemas.microsoft.com/office/drawing/2014/main" xmlns="" id="{898005A2-ECF0-4759-A17B-FDECE80683F4}"/>
+                <a16:creationId xmlns:a16="http://schemas.microsoft.com/office/drawing/2014/main" id="{898005A2-ECF0-4759-A17B-FDECE80683F4}"/>
               </a:ext>
             </a:extLst>
           </p:cNvPr>
@@ -2621,7 +2621,7 @@
           <p:cNvPr id="2" name="Title 1">
             <a:extLst>
               <a:ext uri="{FF2B5EF4-FFF2-40B4-BE49-F238E27FC236}">
-                <a16:creationId xmlns:a16="http://schemas.microsoft.com/office/drawing/2014/main" xmlns="" id="{EEA1DD4B-5676-477E-8C52-4C1CF160FCDE}"/>
+                <a16:creationId xmlns:a16="http://schemas.microsoft.com/office/drawing/2014/main" id="{EEA1DD4B-5676-477E-8C52-4C1CF160FCDE}"/>
               </a:ext>
             </a:extLst>
           </p:cNvPr>
@@ -2660,7 +2660,7 @@
           <p:cNvPr id="3" name="Content Placeholder 2">
             <a:extLst>
               <a:ext uri="{FF2B5EF4-FFF2-40B4-BE49-F238E27FC236}">
-                <a16:creationId xmlns:a16="http://schemas.microsoft.com/office/drawing/2014/main" xmlns="" id="{4B5A3E63-EB15-4D82-BF2B-36BB030C430D}"/>
+                <a16:creationId xmlns:a16="http://schemas.microsoft.com/office/drawing/2014/main" id="{4B5A3E63-EB15-4D82-BF2B-36BB030C430D}"/>
               </a:ext>
             </a:extLst>
           </p:cNvPr>
@@ -2751,7 +2751,7 @@
           <p:cNvPr id="4" name="Text Placeholder 3">
             <a:extLst>
               <a:ext uri="{FF2B5EF4-FFF2-40B4-BE49-F238E27FC236}">
-                <a16:creationId xmlns:a16="http://schemas.microsoft.com/office/drawing/2014/main" xmlns="" id="{7CBE994E-BAB7-43DC-A0E4-C779CF2A33D5}"/>
+                <a16:creationId xmlns:a16="http://schemas.microsoft.com/office/drawing/2014/main" id="{7CBE994E-BAB7-43DC-A0E4-C779CF2A33D5}"/>
               </a:ext>
             </a:extLst>
           </p:cNvPr>
@@ -2822,7 +2822,7 @@
           <p:cNvPr id="5" name="Date Placeholder 4">
             <a:extLst>
               <a:ext uri="{FF2B5EF4-FFF2-40B4-BE49-F238E27FC236}">
-                <a16:creationId xmlns:a16="http://schemas.microsoft.com/office/drawing/2014/main" xmlns="" id="{4EDEFAAA-1B70-42AA-ADCC-F49B58132654}"/>
+                <a16:creationId xmlns:a16="http://schemas.microsoft.com/office/drawing/2014/main" id="{4EDEFAAA-1B70-42AA-ADCC-F49B58132654}"/>
               </a:ext>
             </a:extLst>
           </p:cNvPr>
@@ -2840,7 +2840,7 @@
           <a:p>
             <a:fld id="{A1E45834-53BD-4C8F-B791-CD5378F4150E}" type="datetimeFigureOut">
               <a:rPr lang="en-US" smtClean="0"/>
-              <a:t>5/19/24</a:t>
+              <a:t>5/19/2024</a:t>
             </a:fld>
             <a:endParaRPr lang="en-US"/>
           </a:p>
@@ -2851,7 +2851,7 @@
           <p:cNvPr id="6" name="Footer Placeholder 5">
             <a:extLst>
               <a:ext uri="{FF2B5EF4-FFF2-40B4-BE49-F238E27FC236}">
-                <a16:creationId xmlns:a16="http://schemas.microsoft.com/office/drawing/2014/main" xmlns="" id="{E4C7B6CC-1C13-4F34-AC86-CCD442C8C3DA}"/>
+                <a16:creationId xmlns:a16="http://schemas.microsoft.com/office/drawing/2014/main" id="{E4C7B6CC-1C13-4F34-AC86-CCD442C8C3DA}"/>
               </a:ext>
             </a:extLst>
           </p:cNvPr>
@@ -2876,7 +2876,7 @@
           <p:cNvPr id="7" name="Slide Number Placeholder 6">
             <a:extLst>
               <a:ext uri="{FF2B5EF4-FFF2-40B4-BE49-F238E27FC236}">
-                <a16:creationId xmlns:a16="http://schemas.microsoft.com/office/drawing/2014/main" xmlns="" id="{69F1B638-9061-41AD-AF47-73A4AF8B781A}"/>
+                <a16:creationId xmlns:a16="http://schemas.microsoft.com/office/drawing/2014/main" id="{69F1B638-9061-41AD-AF47-73A4AF8B781A}"/>
               </a:ext>
             </a:extLst>
           </p:cNvPr>
@@ -2935,7 +2935,7 @@
           <p:cNvPr id="2" name="Title 1">
             <a:extLst>
               <a:ext uri="{FF2B5EF4-FFF2-40B4-BE49-F238E27FC236}">
-                <a16:creationId xmlns:a16="http://schemas.microsoft.com/office/drawing/2014/main" xmlns="" id="{7ACF3C43-1676-4A29-83F9-D788ED2E71E9}"/>
+                <a16:creationId xmlns:a16="http://schemas.microsoft.com/office/drawing/2014/main" id="{7ACF3C43-1676-4A29-83F9-D788ED2E71E9}"/>
               </a:ext>
             </a:extLst>
           </p:cNvPr>
@@ -2975,7 +2975,7 @@
           <p:cNvPr id="3" name="Picture Placeholder 2">
             <a:extLst>
               <a:ext uri="{FF2B5EF4-FFF2-40B4-BE49-F238E27FC236}">
-                <a16:creationId xmlns:a16="http://schemas.microsoft.com/office/drawing/2014/main" xmlns="" id="{5214A903-97C7-4349-B8CE-1BBED1942E3B}"/>
+                <a16:creationId xmlns:a16="http://schemas.microsoft.com/office/drawing/2014/main" id="{5214A903-97C7-4349-B8CE-1BBED1942E3B}"/>
               </a:ext>
             </a:extLst>
           </p:cNvPr>
@@ -3045,7 +3045,7 @@
           <p:cNvPr id="4" name="Text Placeholder 3">
             <a:extLst>
               <a:ext uri="{FF2B5EF4-FFF2-40B4-BE49-F238E27FC236}">
-                <a16:creationId xmlns:a16="http://schemas.microsoft.com/office/drawing/2014/main" xmlns="" id="{BF0A9F58-4AEB-4286-98F7-3C77AA913BE8}"/>
+                <a16:creationId xmlns:a16="http://schemas.microsoft.com/office/drawing/2014/main" id="{BF0A9F58-4AEB-4286-98F7-3C77AA913BE8}"/>
               </a:ext>
             </a:extLst>
           </p:cNvPr>
@@ -3116,7 +3116,7 @@
           <p:cNvPr id="5" name="Date Placeholder 4">
             <a:extLst>
               <a:ext uri="{FF2B5EF4-FFF2-40B4-BE49-F238E27FC236}">
-                <a16:creationId xmlns:a16="http://schemas.microsoft.com/office/drawing/2014/main" xmlns="" id="{F4F55A58-F085-4500-AF61-045B12C8F41E}"/>
+                <a16:creationId xmlns:a16="http://schemas.microsoft.com/office/drawing/2014/main" id="{F4F55A58-F085-4500-AF61-045B12C8F41E}"/>
               </a:ext>
             </a:extLst>
           </p:cNvPr>
@@ -3134,7 +3134,7 @@
           <a:p>
             <a:fld id="{A1E45834-53BD-4C8F-B791-CD5378F4150E}" type="datetimeFigureOut">
               <a:rPr lang="en-US" smtClean="0"/>
-              <a:t>5/19/24</a:t>
+              <a:t>5/19/2024</a:t>
             </a:fld>
             <a:endParaRPr lang="en-US"/>
           </a:p>
@@ -3145,7 +3145,7 @@
           <p:cNvPr id="6" name="Footer Placeholder 5">
             <a:extLst>
               <a:ext uri="{FF2B5EF4-FFF2-40B4-BE49-F238E27FC236}">
-                <a16:creationId xmlns:a16="http://schemas.microsoft.com/office/drawing/2014/main" xmlns="" id="{E9936470-561D-49AE-AC84-B79D483FDA77}"/>
+                <a16:creationId xmlns:a16="http://schemas.microsoft.com/office/drawing/2014/main" id="{E9936470-561D-49AE-AC84-B79D483FDA77}"/>
               </a:ext>
             </a:extLst>
           </p:cNvPr>
@@ -3170,7 +3170,7 @@
           <p:cNvPr id="7" name="Slide Number Placeholder 6">
             <a:extLst>
               <a:ext uri="{FF2B5EF4-FFF2-40B4-BE49-F238E27FC236}">
-                <a16:creationId xmlns:a16="http://schemas.microsoft.com/office/drawing/2014/main" xmlns="" id="{6EEF2BE2-DF21-4683-9D5F-849A525FD5C4}"/>
+                <a16:creationId xmlns:a16="http://schemas.microsoft.com/office/drawing/2014/main" id="{6EEF2BE2-DF21-4683-9D5F-849A525FD5C4}"/>
               </a:ext>
             </a:extLst>
           </p:cNvPr>
@@ -3234,7 +3234,7 @@
           <p:cNvPr id="2" name="Title Placeholder 1">
             <a:extLst>
               <a:ext uri="{FF2B5EF4-FFF2-40B4-BE49-F238E27FC236}">
-                <a16:creationId xmlns:a16="http://schemas.microsoft.com/office/drawing/2014/main" xmlns="" id="{9E4438DC-3CEE-4170-9B1C-BAC05CD8C3B5}"/>
+                <a16:creationId xmlns:a16="http://schemas.microsoft.com/office/drawing/2014/main" id="{9E4438DC-3CEE-4170-9B1C-BAC05CD8C3B5}"/>
               </a:ext>
             </a:extLst>
           </p:cNvPr>
@@ -3272,7 +3272,7 @@
           <p:cNvPr id="3" name="Text Placeholder 2">
             <a:extLst>
               <a:ext uri="{FF2B5EF4-FFF2-40B4-BE49-F238E27FC236}">
-                <a16:creationId xmlns:a16="http://schemas.microsoft.com/office/drawing/2014/main" xmlns="" id="{47C19D24-DCBE-47F9-8B85-8A118B02B3C9}"/>
+                <a16:creationId xmlns:a16="http://schemas.microsoft.com/office/drawing/2014/main" id="{47C19D24-DCBE-47F9-8B85-8A118B02B3C9}"/>
               </a:ext>
             </a:extLst>
           </p:cNvPr>
@@ -3339,7 +3339,7 @@
           <p:cNvPr id="4" name="Date Placeholder 3">
             <a:extLst>
               <a:ext uri="{FF2B5EF4-FFF2-40B4-BE49-F238E27FC236}">
-                <a16:creationId xmlns:a16="http://schemas.microsoft.com/office/drawing/2014/main" xmlns="" id="{334F5788-BDCE-49E2-80AE-31C739C6A0CE}"/>
+                <a16:creationId xmlns:a16="http://schemas.microsoft.com/office/drawing/2014/main" id="{334F5788-BDCE-49E2-80AE-31C739C6A0CE}"/>
               </a:ext>
             </a:extLst>
           </p:cNvPr>
@@ -3373,7 +3373,7 @@
           <a:p>
             <a:fld id="{A1E45834-53BD-4C8F-B791-CD5378F4150E}" type="datetimeFigureOut">
               <a:rPr lang="en-US" smtClean="0"/>
-              <a:t>5/19/24</a:t>
+              <a:t>5/19/2024</a:t>
             </a:fld>
             <a:endParaRPr lang="en-US"/>
           </a:p>
@@ -3384,7 +3384,7 @@
           <p:cNvPr id="5" name="Footer Placeholder 4">
             <a:extLst>
               <a:ext uri="{FF2B5EF4-FFF2-40B4-BE49-F238E27FC236}">
-                <a16:creationId xmlns:a16="http://schemas.microsoft.com/office/drawing/2014/main" xmlns="" id="{FD1D5844-8163-4D82-BEFC-BC2D8D511B7E}"/>
+                <a16:creationId xmlns:a16="http://schemas.microsoft.com/office/drawing/2014/main" id="{FD1D5844-8163-4D82-BEFC-BC2D8D511B7E}"/>
               </a:ext>
             </a:extLst>
           </p:cNvPr>
@@ -3425,7 +3425,7 @@
           <p:cNvPr id="6" name="Slide Number Placeholder 5">
             <a:extLst>
               <a:ext uri="{FF2B5EF4-FFF2-40B4-BE49-F238E27FC236}">
-                <a16:creationId xmlns:a16="http://schemas.microsoft.com/office/drawing/2014/main" xmlns="" id="{22698A50-C435-4220-82C6-C8D62A7C9EB0}"/>
+                <a16:creationId xmlns:a16="http://schemas.microsoft.com/office/drawing/2014/main" id="{22698A50-C435-4220-82C6-C8D62A7C9EB0}"/>
               </a:ext>
             </a:extLst>
           </p:cNvPr>
@@ -3470,7 +3470,7 @@
           <p:cNvPr id="28" name="Straight Connector 27">
             <a:extLst>
               <a:ext uri="{FF2B5EF4-FFF2-40B4-BE49-F238E27FC236}">
-                <a16:creationId xmlns:a16="http://schemas.microsoft.com/office/drawing/2014/main" xmlns="" id="{D8689CE0-64D2-447C-9C1F-872D111D8AC3}"/>
+                <a16:creationId xmlns:a16="http://schemas.microsoft.com/office/drawing/2014/main" id="{D8689CE0-64D2-447C-9C1F-872D111D8AC3}"/>
               </a:ext>
             </a:extLst>
           </p:cNvPr>
@@ -3842,10 +3842,10 @@
           <p:cNvPr id="28" name="Rectangle 27">
             <a:extLst>
               <a:ext uri="{FF2B5EF4-FFF2-40B4-BE49-F238E27FC236}">
-                <a16:creationId xmlns:a16="http://schemas.microsoft.com/office/drawing/2014/main" xmlns="" id="{511C99DC-C3C5-4EBE-91DD-345109C3D6E0}"/>
+                <a16:creationId xmlns:a16="http://schemas.microsoft.com/office/drawing/2014/main" id="{511C99DC-C3C5-4EBE-91DD-345109C3D6E0}"/>
               </a:ext>
               <a:ext uri="{C183D7F6-B498-43B3-948B-1728B52AA6E4}">
-                <adec:decorative xmlns:adec="http://schemas.microsoft.com/office/drawing/2017/decorative" xmlns="" val="1"/>
+                <adec:decorative xmlns:adec="http://schemas.microsoft.com/office/drawing/2017/decorative" val="1"/>
               </a:ext>
             </a:extLst>
           </p:cNvPr>
@@ -3918,7 +3918,7 @@
           <p:cNvPr id="2" name="Title 1">
             <a:extLst>
               <a:ext uri="{FF2B5EF4-FFF2-40B4-BE49-F238E27FC236}">
-                <a16:creationId xmlns:a16="http://schemas.microsoft.com/office/drawing/2014/main" xmlns="" id="{01BEAD8A-7C3A-ACD7-BA96-0AEA6C6F4324}"/>
+                <a16:creationId xmlns:a16="http://schemas.microsoft.com/office/drawing/2014/main" id="{01BEAD8A-7C3A-ACD7-BA96-0AEA6C6F4324}"/>
               </a:ext>
             </a:extLst>
           </p:cNvPr>
@@ -3957,7 +3957,7 @@
           <p:cNvPr id="3" name="Subtitle 2">
             <a:extLst>
               <a:ext uri="{FF2B5EF4-FFF2-40B4-BE49-F238E27FC236}">
-                <a16:creationId xmlns:a16="http://schemas.microsoft.com/office/drawing/2014/main" xmlns="" id="{BC4192FA-6231-B3DB-FF87-005E37589D8E}"/>
+                <a16:creationId xmlns:a16="http://schemas.microsoft.com/office/drawing/2014/main" id="{BC4192FA-6231-B3DB-FF87-005E37589D8E}"/>
               </a:ext>
             </a:extLst>
           </p:cNvPr>
@@ -4018,10 +4018,10 @@
           <p:cNvPr id="30" name="Straight Connector 29">
             <a:extLst>
               <a:ext uri="{FF2B5EF4-FFF2-40B4-BE49-F238E27FC236}">
-                <a16:creationId xmlns:a16="http://schemas.microsoft.com/office/drawing/2014/main" xmlns="" id="{B0AA360F-DECB-4836-8FB6-22C4BC3FB02D}"/>
+                <a16:creationId xmlns:a16="http://schemas.microsoft.com/office/drawing/2014/main" id="{B0AA360F-DECB-4836-8FB6-22C4BC3FB02D}"/>
               </a:ext>
               <a:ext uri="{C183D7F6-B498-43B3-948B-1728B52AA6E4}">
-                <adec:decorative xmlns:adec="http://schemas.microsoft.com/office/drawing/2017/decorative" xmlns="" val="1"/>
+                <adec:decorative xmlns:adec="http://schemas.microsoft.com/office/drawing/2017/decorative" val="1"/>
               </a:ext>
             </a:extLst>
           </p:cNvPr>
@@ -4070,7 +4070,7 @@
           <p:cNvPr id="8" name="Picture 7" descr="Connected sticks shaping polygons background">
             <a:extLst>
               <a:ext uri="{FF2B5EF4-FFF2-40B4-BE49-F238E27FC236}">
-                <a16:creationId xmlns:a16="http://schemas.microsoft.com/office/drawing/2014/main" xmlns="" id="{2C9322FB-F39F-A89A-B656-986F1E3BB273}"/>
+                <a16:creationId xmlns:a16="http://schemas.microsoft.com/office/drawing/2014/main" id="{2C9322FB-F39F-A89A-B656-986F1E3BB273}"/>
               </a:ext>
             </a:extLst>
           </p:cNvPr>
@@ -4129,7 +4129,7 @@
           <p:cNvPr id="2" name="Title 1">
             <a:extLst>
               <a:ext uri="{FF2B5EF4-FFF2-40B4-BE49-F238E27FC236}">
-                <a16:creationId xmlns:a16="http://schemas.microsoft.com/office/drawing/2014/main" xmlns="" id="{826E4E61-93D0-4561-E540-E7D3E698A051}"/>
+                <a16:creationId xmlns:a16="http://schemas.microsoft.com/office/drawing/2014/main" id="{826E4E61-93D0-4561-E540-E7D3E698A051}"/>
               </a:ext>
             </a:extLst>
           </p:cNvPr>
@@ -4164,7 +4164,7 @@
           <p:cNvPr id="4" name="TextBox 3">
             <a:extLst>
               <a:ext uri="{FF2B5EF4-FFF2-40B4-BE49-F238E27FC236}">
-                <a16:creationId xmlns:a16="http://schemas.microsoft.com/office/drawing/2014/main" xmlns="" id="{A3CD43EE-9E0D-C87D-A567-729B4A4CA739}"/>
+                <a16:creationId xmlns:a16="http://schemas.microsoft.com/office/drawing/2014/main" id="{A3CD43EE-9E0D-C87D-A567-729B4A4CA739}"/>
               </a:ext>
             </a:extLst>
           </p:cNvPr>
@@ -4243,7 +4243,7 @@
           <p:cNvPr id="5" name="Table 4">
             <a:extLst>
               <a:ext uri="{FF2B5EF4-FFF2-40B4-BE49-F238E27FC236}">
-                <a16:creationId xmlns:a16="http://schemas.microsoft.com/office/drawing/2014/main" xmlns="" id="{9934400E-CCB9-5308-7A9A-161BF89144F8}"/>
+                <a16:creationId xmlns:a16="http://schemas.microsoft.com/office/drawing/2014/main" id="{9934400E-CCB9-5308-7A9A-161BF89144F8}"/>
               </a:ext>
             </a:extLst>
           </p:cNvPr>
@@ -4272,49 +4272,49 @@
                 <a:gridCol w="1621643">
                   <a:extLst>
                     <a:ext uri="{9D8B030D-6E8A-4147-A177-3AD203B41FA5}">
-                      <a16:colId xmlns:a16="http://schemas.microsoft.com/office/drawing/2014/main" xmlns="" val="3041726463"/>
+                      <a16:colId xmlns:a16="http://schemas.microsoft.com/office/drawing/2014/main" val="3041726463"/>
                     </a:ext>
                   </a:extLst>
                 </a:gridCol>
                 <a:gridCol w="1114346">
                   <a:extLst>
                     <a:ext uri="{9D8B030D-6E8A-4147-A177-3AD203B41FA5}">
-                      <a16:colId xmlns:a16="http://schemas.microsoft.com/office/drawing/2014/main" xmlns="" val="2437366668"/>
+                      <a16:colId xmlns:a16="http://schemas.microsoft.com/office/drawing/2014/main" val="2437366668"/>
                     </a:ext>
                   </a:extLst>
                 </a:gridCol>
                 <a:gridCol w="1114346">
                   <a:extLst>
                     <a:ext uri="{9D8B030D-6E8A-4147-A177-3AD203B41FA5}">
-                      <a16:colId xmlns:a16="http://schemas.microsoft.com/office/drawing/2014/main" xmlns="" val="531118449"/>
+                      <a16:colId xmlns:a16="http://schemas.microsoft.com/office/drawing/2014/main" val="531118449"/>
                     </a:ext>
                   </a:extLst>
                 </a:gridCol>
                 <a:gridCol w="1114346">
                   <a:extLst>
                     <a:ext uri="{9D8B030D-6E8A-4147-A177-3AD203B41FA5}">
-                      <a16:colId xmlns:a16="http://schemas.microsoft.com/office/drawing/2014/main" xmlns="" val="2564084159"/>
+                      <a16:colId xmlns:a16="http://schemas.microsoft.com/office/drawing/2014/main" val="2564084159"/>
                     </a:ext>
                   </a:extLst>
                 </a:gridCol>
                 <a:gridCol w="1114346">
                   <a:extLst>
                     <a:ext uri="{9D8B030D-6E8A-4147-A177-3AD203B41FA5}">
-                      <a16:colId xmlns:a16="http://schemas.microsoft.com/office/drawing/2014/main" xmlns="" val="2779029642"/>
+                      <a16:colId xmlns:a16="http://schemas.microsoft.com/office/drawing/2014/main" val="2779029642"/>
                     </a:ext>
                   </a:extLst>
                 </a:gridCol>
                 <a:gridCol w="1114346">
                   <a:extLst>
                     <a:ext uri="{9D8B030D-6E8A-4147-A177-3AD203B41FA5}">
-                      <a16:colId xmlns:a16="http://schemas.microsoft.com/office/drawing/2014/main" xmlns="" val="3129705701"/>
+                      <a16:colId xmlns:a16="http://schemas.microsoft.com/office/drawing/2014/main" val="3129705701"/>
                     </a:ext>
                   </a:extLst>
                 </a:gridCol>
                 <a:gridCol w="1114346">
                   <a:extLst>
                     <a:ext uri="{9D8B030D-6E8A-4147-A177-3AD203B41FA5}">
-                      <a16:colId xmlns:a16="http://schemas.microsoft.com/office/drawing/2014/main" xmlns="" val="3319955156"/>
+                      <a16:colId xmlns:a16="http://schemas.microsoft.com/office/drawing/2014/main" val="3319955156"/>
                     </a:ext>
                   </a:extLst>
                 </a:gridCol>
@@ -4637,7 +4637,7 @@
                 </a:tc>
                 <a:extLst>
                   <a:ext uri="{0D108BD9-81ED-4DB2-BD59-A6C34878D82A}">
-                    <a16:rowId xmlns:a16="http://schemas.microsoft.com/office/drawing/2014/main" xmlns="" val="419171914"/>
+                    <a16:rowId xmlns:a16="http://schemas.microsoft.com/office/drawing/2014/main" val="419171914"/>
                   </a:ext>
                 </a:extLst>
               </a:tr>
@@ -5022,7 +5022,7 @@
                 </a:tc>
                 <a:extLst>
                   <a:ext uri="{0D108BD9-81ED-4DB2-BD59-A6C34878D82A}">
-                    <a16:rowId xmlns:a16="http://schemas.microsoft.com/office/drawing/2014/main" xmlns="" val="1434253989"/>
+                    <a16:rowId xmlns:a16="http://schemas.microsoft.com/office/drawing/2014/main" val="1434253989"/>
                   </a:ext>
                 </a:extLst>
               </a:tr>
@@ -5408,7 +5408,7 @@
                 </a:tc>
                 <a:extLst>
                   <a:ext uri="{0D108BD9-81ED-4DB2-BD59-A6C34878D82A}">
-                    <a16:rowId xmlns:a16="http://schemas.microsoft.com/office/drawing/2014/main" xmlns="" val="1123582624"/>
+                    <a16:rowId xmlns:a16="http://schemas.microsoft.com/office/drawing/2014/main" val="1123582624"/>
                   </a:ext>
                 </a:extLst>
               </a:tr>
@@ -5787,7 +5787,7 @@
                 </a:tc>
                 <a:extLst>
                   <a:ext uri="{0D108BD9-81ED-4DB2-BD59-A6C34878D82A}">
-                    <a16:rowId xmlns:a16="http://schemas.microsoft.com/office/drawing/2014/main" xmlns="" val="1194998983"/>
+                    <a16:rowId xmlns:a16="http://schemas.microsoft.com/office/drawing/2014/main" val="1194998983"/>
                   </a:ext>
                 </a:extLst>
               </a:tr>
@@ -6110,7 +6110,7 @@
                 </a:tc>
                 <a:extLst>
                   <a:ext uri="{0D108BD9-81ED-4DB2-BD59-A6C34878D82A}">
-                    <a16:rowId xmlns:a16="http://schemas.microsoft.com/office/drawing/2014/main" xmlns="" val="3886053095"/>
+                    <a16:rowId xmlns:a16="http://schemas.microsoft.com/office/drawing/2014/main" val="3886053095"/>
                   </a:ext>
                 </a:extLst>
               </a:tr>
@@ -6153,7 +6153,7 @@
           <p:cNvPr id="2" name="Title 1">
             <a:extLst>
               <a:ext uri="{FF2B5EF4-FFF2-40B4-BE49-F238E27FC236}">
-                <a16:creationId xmlns:a16="http://schemas.microsoft.com/office/drawing/2014/main" xmlns="" id="{826E4E61-93D0-4561-E540-E7D3E698A051}"/>
+                <a16:creationId xmlns:a16="http://schemas.microsoft.com/office/drawing/2014/main" id="{826E4E61-93D0-4561-E540-E7D3E698A051}"/>
               </a:ext>
             </a:extLst>
           </p:cNvPr>
@@ -6188,7 +6188,7 @@
           <p:cNvPr id="4" name="TextBox 3">
             <a:extLst>
               <a:ext uri="{FF2B5EF4-FFF2-40B4-BE49-F238E27FC236}">
-                <a16:creationId xmlns:a16="http://schemas.microsoft.com/office/drawing/2014/main" xmlns="" id="{A3CD43EE-9E0D-C87D-A567-729B4A4CA739}"/>
+                <a16:creationId xmlns:a16="http://schemas.microsoft.com/office/drawing/2014/main" id="{A3CD43EE-9E0D-C87D-A567-729B4A4CA739}"/>
               </a:ext>
             </a:extLst>
           </p:cNvPr>
@@ -6267,7 +6267,7 @@
           <p:cNvPr id="5" name="Table 4">
             <a:extLst>
               <a:ext uri="{FF2B5EF4-FFF2-40B4-BE49-F238E27FC236}">
-                <a16:creationId xmlns:a16="http://schemas.microsoft.com/office/drawing/2014/main" xmlns="" id="{9934400E-CCB9-5308-7A9A-161BF89144F8}"/>
+                <a16:creationId xmlns:a16="http://schemas.microsoft.com/office/drawing/2014/main" id="{9934400E-CCB9-5308-7A9A-161BF89144F8}"/>
               </a:ext>
             </a:extLst>
           </p:cNvPr>
@@ -6296,49 +6296,49 @@
                 <a:gridCol w="1621643">
                   <a:extLst>
                     <a:ext uri="{9D8B030D-6E8A-4147-A177-3AD203B41FA5}">
-                      <a16:colId xmlns:a16="http://schemas.microsoft.com/office/drawing/2014/main" xmlns="" val="3041726463"/>
+                      <a16:colId xmlns:a16="http://schemas.microsoft.com/office/drawing/2014/main" val="3041726463"/>
                     </a:ext>
                   </a:extLst>
                 </a:gridCol>
                 <a:gridCol w="1114346">
                   <a:extLst>
                     <a:ext uri="{9D8B030D-6E8A-4147-A177-3AD203B41FA5}">
-                      <a16:colId xmlns:a16="http://schemas.microsoft.com/office/drawing/2014/main" xmlns="" val="2437366668"/>
+                      <a16:colId xmlns:a16="http://schemas.microsoft.com/office/drawing/2014/main" val="2437366668"/>
                     </a:ext>
                   </a:extLst>
                 </a:gridCol>
                 <a:gridCol w="1114346">
                   <a:extLst>
                     <a:ext uri="{9D8B030D-6E8A-4147-A177-3AD203B41FA5}">
-                      <a16:colId xmlns:a16="http://schemas.microsoft.com/office/drawing/2014/main" xmlns="" val="531118449"/>
+                      <a16:colId xmlns:a16="http://schemas.microsoft.com/office/drawing/2014/main" val="531118449"/>
                     </a:ext>
                   </a:extLst>
                 </a:gridCol>
                 <a:gridCol w="1114346">
                   <a:extLst>
                     <a:ext uri="{9D8B030D-6E8A-4147-A177-3AD203B41FA5}">
-                      <a16:colId xmlns:a16="http://schemas.microsoft.com/office/drawing/2014/main" xmlns="" val="2564084159"/>
+                      <a16:colId xmlns:a16="http://schemas.microsoft.com/office/drawing/2014/main" val="2564084159"/>
                     </a:ext>
                   </a:extLst>
                 </a:gridCol>
                 <a:gridCol w="1114346">
                   <a:extLst>
                     <a:ext uri="{9D8B030D-6E8A-4147-A177-3AD203B41FA5}">
-                      <a16:colId xmlns:a16="http://schemas.microsoft.com/office/drawing/2014/main" xmlns="" val="2779029642"/>
+                      <a16:colId xmlns:a16="http://schemas.microsoft.com/office/drawing/2014/main" val="2779029642"/>
                     </a:ext>
                   </a:extLst>
                 </a:gridCol>
                 <a:gridCol w="1114346">
                   <a:extLst>
                     <a:ext uri="{9D8B030D-6E8A-4147-A177-3AD203B41FA5}">
-                      <a16:colId xmlns:a16="http://schemas.microsoft.com/office/drawing/2014/main" xmlns="" val="3129705701"/>
+                      <a16:colId xmlns:a16="http://schemas.microsoft.com/office/drawing/2014/main" val="3129705701"/>
                     </a:ext>
                   </a:extLst>
                 </a:gridCol>
                 <a:gridCol w="1114346">
                   <a:extLst>
                     <a:ext uri="{9D8B030D-6E8A-4147-A177-3AD203B41FA5}">
-                      <a16:colId xmlns:a16="http://schemas.microsoft.com/office/drawing/2014/main" xmlns="" val="3319955156"/>
+                      <a16:colId xmlns:a16="http://schemas.microsoft.com/office/drawing/2014/main" val="3319955156"/>
                     </a:ext>
                   </a:extLst>
                 </a:gridCol>
@@ -6661,7 +6661,7 @@
                 </a:tc>
                 <a:extLst>
                   <a:ext uri="{0D108BD9-81ED-4DB2-BD59-A6C34878D82A}">
-                    <a16:rowId xmlns:a16="http://schemas.microsoft.com/office/drawing/2014/main" xmlns="" val="419171914"/>
+                    <a16:rowId xmlns:a16="http://schemas.microsoft.com/office/drawing/2014/main" val="419171914"/>
                   </a:ext>
                 </a:extLst>
               </a:tr>
@@ -7046,7 +7046,7 @@
                 </a:tc>
                 <a:extLst>
                   <a:ext uri="{0D108BD9-81ED-4DB2-BD59-A6C34878D82A}">
-                    <a16:rowId xmlns:a16="http://schemas.microsoft.com/office/drawing/2014/main" xmlns="" val="1434253989"/>
+                    <a16:rowId xmlns:a16="http://schemas.microsoft.com/office/drawing/2014/main" val="1434253989"/>
                   </a:ext>
                 </a:extLst>
               </a:tr>
@@ -7435,7 +7435,7 @@
                 </a:tc>
                 <a:extLst>
                   <a:ext uri="{0D108BD9-81ED-4DB2-BD59-A6C34878D82A}">
-                    <a16:rowId xmlns:a16="http://schemas.microsoft.com/office/drawing/2014/main" xmlns="" val="1123582624"/>
+                    <a16:rowId xmlns:a16="http://schemas.microsoft.com/office/drawing/2014/main" val="1123582624"/>
                   </a:ext>
                 </a:extLst>
               </a:tr>
@@ -7817,7 +7817,7 @@
                 </a:tc>
                 <a:extLst>
                   <a:ext uri="{0D108BD9-81ED-4DB2-BD59-A6C34878D82A}">
-                    <a16:rowId xmlns:a16="http://schemas.microsoft.com/office/drawing/2014/main" xmlns="" val="1194998983"/>
+                    <a16:rowId xmlns:a16="http://schemas.microsoft.com/office/drawing/2014/main" val="1194998983"/>
                   </a:ext>
                 </a:extLst>
               </a:tr>
@@ -8143,7 +8143,7 @@
                 </a:tc>
                 <a:extLst>
                   <a:ext uri="{0D108BD9-81ED-4DB2-BD59-A6C34878D82A}">
-                    <a16:rowId xmlns:a16="http://schemas.microsoft.com/office/drawing/2014/main" xmlns="" val="3886053095"/>
+                    <a16:rowId xmlns:a16="http://schemas.microsoft.com/office/drawing/2014/main" val="3886053095"/>
                   </a:ext>
                 </a:extLst>
               </a:tr>
@@ -8186,7 +8186,7 @@
           <p:cNvPr id="2" name="Title 1">
             <a:extLst>
               <a:ext uri="{FF2B5EF4-FFF2-40B4-BE49-F238E27FC236}">
-                <a16:creationId xmlns:a16="http://schemas.microsoft.com/office/drawing/2014/main" xmlns="" id="{826E4E61-93D0-4561-E540-E7D3E698A051}"/>
+                <a16:creationId xmlns:a16="http://schemas.microsoft.com/office/drawing/2014/main" id="{826E4E61-93D0-4561-E540-E7D3E698A051}"/>
               </a:ext>
             </a:extLst>
           </p:cNvPr>
@@ -8221,7 +8221,7 @@
           <p:cNvPr id="4" name="TextBox 3">
             <a:extLst>
               <a:ext uri="{FF2B5EF4-FFF2-40B4-BE49-F238E27FC236}">
-                <a16:creationId xmlns:a16="http://schemas.microsoft.com/office/drawing/2014/main" xmlns="" id="{A3CD43EE-9E0D-C87D-A567-729B4A4CA739}"/>
+                <a16:creationId xmlns:a16="http://schemas.microsoft.com/office/drawing/2014/main" id="{A3CD43EE-9E0D-C87D-A567-729B4A4CA739}"/>
               </a:ext>
             </a:extLst>
           </p:cNvPr>
@@ -8300,7 +8300,7 @@
           <p:cNvPr id="5" name="Table 4">
             <a:extLst>
               <a:ext uri="{FF2B5EF4-FFF2-40B4-BE49-F238E27FC236}">
-                <a16:creationId xmlns:a16="http://schemas.microsoft.com/office/drawing/2014/main" xmlns="" id="{9934400E-CCB9-5308-7A9A-161BF89144F8}"/>
+                <a16:creationId xmlns:a16="http://schemas.microsoft.com/office/drawing/2014/main" id="{9934400E-CCB9-5308-7A9A-161BF89144F8}"/>
               </a:ext>
             </a:extLst>
           </p:cNvPr>
@@ -8329,49 +8329,49 @@
                 <a:gridCol w="1621643">
                   <a:extLst>
                     <a:ext uri="{9D8B030D-6E8A-4147-A177-3AD203B41FA5}">
-                      <a16:colId xmlns:a16="http://schemas.microsoft.com/office/drawing/2014/main" xmlns="" val="3041726463"/>
+                      <a16:colId xmlns:a16="http://schemas.microsoft.com/office/drawing/2014/main" val="3041726463"/>
                     </a:ext>
                   </a:extLst>
                 </a:gridCol>
                 <a:gridCol w="1114346">
                   <a:extLst>
                     <a:ext uri="{9D8B030D-6E8A-4147-A177-3AD203B41FA5}">
-                      <a16:colId xmlns:a16="http://schemas.microsoft.com/office/drawing/2014/main" xmlns="" val="2437366668"/>
+                      <a16:colId xmlns:a16="http://schemas.microsoft.com/office/drawing/2014/main" val="2437366668"/>
                     </a:ext>
                   </a:extLst>
                 </a:gridCol>
                 <a:gridCol w="1114346">
                   <a:extLst>
                     <a:ext uri="{9D8B030D-6E8A-4147-A177-3AD203B41FA5}">
-                      <a16:colId xmlns:a16="http://schemas.microsoft.com/office/drawing/2014/main" xmlns="" val="531118449"/>
+                      <a16:colId xmlns:a16="http://schemas.microsoft.com/office/drawing/2014/main" val="531118449"/>
                     </a:ext>
                   </a:extLst>
                 </a:gridCol>
                 <a:gridCol w="1114346">
                   <a:extLst>
                     <a:ext uri="{9D8B030D-6E8A-4147-A177-3AD203B41FA5}">
-                      <a16:colId xmlns:a16="http://schemas.microsoft.com/office/drawing/2014/main" xmlns="" val="2564084159"/>
+                      <a16:colId xmlns:a16="http://schemas.microsoft.com/office/drawing/2014/main" val="2564084159"/>
                     </a:ext>
                   </a:extLst>
                 </a:gridCol>
                 <a:gridCol w="1114346">
                   <a:extLst>
                     <a:ext uri="{9D8B030D-6E8A-4147-A177-3AD203B41FA5}">
-                      <a16:colId xmlns:a16="http://schemas.microsoft.com/office/drawing/2014/main" xmlns="" val="2779029642"/>
+                      <a16:colId xmlns:a16="http://schemas.microsoft.com/office/drawing/2014/main" val="2779029642"/>
                     </a:ext>
                   </a:extLst>
                 </a:gridCol>
                 <a:gridCol w="1114346">
                   <a:extLst>
                     <a:ext uri="{9D8B030D-6E8A-4147-A177-3AD203B41FA5}">
-                      <a16:colId xmlns:a16="http://schemas.microsoft.com/office/drawing/2014/main" xmlns="" val="3129705701"/>
+                      <a16:colId xmlns:a16="http://schemas.microsoft.com/office/drawing/2014/main" val="3129705701"/>
                     </a:ext>
                   </a:extLst>
                 </a:gridCol>
                 <a:gridCol w="1114346">
                   <a:extLst>
                     <a:ext uri="{9D8B030D-6E8A-4147-A177-3AD203B41FA5}">
-                      <a16:colId xmlns:a16="http://schemas.microsoft.com/office/drawing/2014/main" xmlns="" val="3319955156"/>
+                      <a16:colId xmlns:a16="http://schemas.microsoft.com/office/drawing/2014/main" val="3319955156"/>
                     </a:ext>
                   </a:extLst>
                 </a:gridCol>
@@ -8694,7 +8694,7 @@
                 </a:tc>
                 <a:extLst>
                   <a:ext uri="{0D108BD9-81ED-4DB2-BD59-A6C34878D82A}">
-                    <a16:rowId xmlns:a16="http://schemas.microsoft.com/office/drawing/2014/main" xmlns="" val="419171914"/>
+                    <a16:rowId xmlns:a16="http://schemas.microsoft.com/office/drawing/2014/main" val="419171914"/>
                   </a:ext>
                 </a:extLst>
               </a:tr>
@@ -9079,7 +9079,7 @@
                 </a:tc>
                 <a:extLst>
                   <a:ext uri="{0D108BD9-81ED-4DB2-BD59-A6C34878D82A}">
-                    <a16:rowId xmlns:a16="http://schemas.microsoft.com/office/drawing/2014/main" xmlns="" val="1434253989"/>
+                    <a16:rowId xmlns:a16="http://schemas.microsoft.com/office/drawing/2014/main" val="1434253989"/>
                   </a:ext>
                 </a:extLst>
               </a:tr>
@@ -9471,7 +9471,7 @@
                 </a:tc>
                 <a:extLst>
                   <a:ext uri="{0D108BD9-81ED-4DB2-BD59-A6C34878D82A}">
-                    <a16:rowId xmlns:a16="http://schemas.microsoft.com/office/drawing/2014/main" xmlns="" val="1123582624"/>
+                    <a16:rowId xmlns:a16="http://schemas.microsoft.com/office/drawing/2014/main" val="1123582624"/>
                   </a:ext>
                 </a:extLst>
               </a:tr>
@@ -9856,7 +9856,7 @@
                 </a:tc>
                 <a:extLst>
                   <a:ext uri="{0D108BD9-81ED-4DB2-BD59-A6C34878D82A}">
-                    <a16:rowId xmlns:a16="http://schemas.microsoft.com/office/drawing/2014/main" xmlns="" val="1194998983"/>
+                    <a16:rowId xmlns:a16="http://schemas.microsoft.com/office/drawing/2014/main" val="1194998983"/>
                   </a:ext>
                 </a:extLst>
               </a:tr>
@@ -10185,7 +10185,7 @@
                 </a:tc>
                 <a:extLst>
                   <a:ext uri="{0D108BD9-81ED-4DB2-BD59-A6C34878D82A}">
-                    <a16:rowId xmlns:a16="http://schemas.microsoft.com/office/drawing/2014/main" xmlns="" val="3886053095"/>
+                    <a16:rowId xmlns:a16="http://schemas.microsoft.com/office/drawing/2014/main" val="3886053095"/>
                   </a:ext>
                 </a:extLst>
               </a:tr>
@@ -10228,7 +10228,7 @@
           <p:cNvPr id="2" name="Title 1">
             <a:extLst>
               <a:ext uri="{FF2B5EF4-FFF2-40B4-BE49-F238E27FC236}">
-                <a16:creationId xmlns:a16="http://schemas.microsoft.com/office/drawing/2014/main" xmlns="" id="{826E4E61-93D0-4561-E540-E7D3E698A051}"/>
+                <a16:creationId xmlns:a16="http://schemas.microsoft.com/office/drawing/2014/main" id="{826E4E61-93D0-4561-E540-E7D3E698A051}"/>
               </a:ext>
             </a:extLst>
           </p:cNvPr>
@@ -10263,7 +10263,7 @@
           <p:cNvPr id="4" name="TextBox 3">
             <a:extLst>
               <a:ext uri="{FF2B5EF4-FFF2-40B4-BE49-F238E27FC236}">
-                <a16:creationId xmlns:a16="http://schemas.microsoft.com/office/drawing/2014/main" xmlns="" id="{A3CD43EE-9E0D-C87D-A567-729B4A4CA739}"/>
+                <a16:creationId xmlns:a16="http://schemas.microsoft.com/office/drawing/2014/main" id="{A3CD43EE-9E0D-C87D-A567-729B4A4CA739}"/>
               </a:ext>
             </a:extLst>
           </p:cNvPr>
@@ -10342,7 +10342,7 @@
           <p:cNvPr id="5" name="Table 4">
             <a:extLst>
               <a:ext uri="{FF2B5EF4-FFF2-40B4-BE49-F238E27FC236}">
-                <a16:creationId xmlns:a16="http://schemas.microsoft.com/office/drawing/2014/main" xmlns="" id="{9934400E-CCB9-5308-7A9A-161BF89144F8}"/>
+                <a16:creationId xmlns:a16="http://schemas.microsoft.com/office/drawing/2014/main" id="{9934400E-CCB9-5308-7A9A-161BF89144F8}"/>
               </a:ext>
             </a:extLst>
           </p:cNvPr>
@@ -10371,56 +10371,56 @@
                 <a:gridCol w="1621643">
                   <a:extLst>
                     <a:ext uri="{9D8B030D-6E8A-4147-A177-3AD203B41FA5}">
-                      <a16:colId xmlns:a16="http://schemas.microsoft.com/office/drawing/2014/main" xmlns="" val="3041726463"/>
+                      <a16:colId xmlns:a16="http://schemas.microsoft.com/office/drawing/2014/main" val="3041726463"/>
                     </a:ext>
                   </a:extLst>
                 </a:gridCol>
                 <a:gridCol w="1114346">
                   <a:extLst>
                     <a:ext uri="{9D8B030D-6E8A-4147-A177-3AD203B41FA5}">
-                      <a16:colId xmlns:a16="http://schemas.microsoft.com/office/drawing/2014/main" xmlns="" val="2437366668"/>
+                      <a16:colId xmlns:a16="http://schemas.microsoft.com/office/drawing/2014/main" val="2437366668"/>
                     </a:ext>
                   </a:extLst>
                 </a:gridCol>
                 <a:gridCol w="1114346">
                   <a:extLst>
                     <a:ext uri="{9D8B030D-6E8A-4147-A177-3AD203B41FA5}">
-                      <a16:colId xmlns:a16="http://schemas.microsoft.com/office/drawing/2014/main" xmlns="" val="531118449"/>
+                      <a16:colId xmlns:a16="http://schemas.microsoft.com/office/drawing/2014/main" val="531118449"/>
                     </a:ext>
                   </a:extLst>
                 </a:gridCol>
                 <a:gridCol w="1114346">
                   <a:extLst>
                     <a:ext uri="{9D8B030D-6E8A-4147-A177-3AD203B41FA5}">
-                      <a16:colId xmlns:a16="http://schemas.microsoft.com/office/drawing/2014/main" xmlns="" val="2564084159"/>
+                      <a16:colId xmlns:a16="http://schemas.microsoft.com/office/drawing/2014/main" val="2564084159"/>
                     </a:ext>
                   </a:extLst>
                 </a:gridCol>
                 <a:gridCol w="1114346">
                   <a:extLst>
                     <a:ext uri="{9D8B030D-6E8A-4147-A177-3AD203B41FA5}">
-                      <a16:colId xmlns:a16="http://schemas.microsoft.com/office/drawing/2014/main" xmlns="" val="2779029642"/>
+                      <a16:colId xmlns:a16="http://schemas.microsoft.com/office/drawing/2014/main" val="2779029642"/>
                     </a:ext>
                   </a:extLst>
                 </a:gridCol>
                 <a:gridCol w="1114346">
                   <a:extLst>
                     <a:ext uri="{9D8B030D-6E8A-4147-A177-3AD203B41FA5}">
-                      <a16:colId xmlns:a16="http://schemas.microsoft.com/office/drawing/2014/main" xmlns="" val="3129705701"/>
+                      <a16:colId xmlns:a16="http://schemas.microsoft.com/office/drawing/2014/main" val="3129705701"/>
                     </a:ext>
                   </a:extLst>
                 </a:gridCol>
                 <a:gridCol w="1114346">
                   <a:extLst>
                     <a:ext uri="{9D8B030D-6E8A-4147-A177-3AD203B41FA5}">
-                      <a16:colId xmlns:a16="http://schemas.microsoft.com/office/drawing/2014/main" xmlns="" val="3319955156"/>
+                      <a16:colId xmlns:a16="http://schemas.microsoft.com/office/drawing/2014/main" val="3319955156"/>
                     </a:ext>
                   </a:extLst>
                 </a:gridCol>
                 <a:gridCol w="1114346">
                   <a:extLst>
                     <a:ext uri="{9D8B030D-6E8A-4147-A177-3AD203B41FA5}">
-                      <a16:colId xmlns:a16="http://schemas.microsoft.com/office/drawing/2014/main" xmlns="" val="48135494"/>
+                      <a16:colId xmlns:a16="http://schemas.microsoft.com/office/drawing/2014/main" val="48135494"/>
                     </a:ext>
                   </a:extLst>
                 </a:gridCol>
@@ -10780,7 +10780,7 @@
                 </a:tc>
                 <a:extLst>
                   <a:ext uri="{0D108BD9-81ED-4DB2-BD59-A6C34878D82A}">
-                    <a16:rowId xmlns:a16="http://schemas.microsoft.com/office/drawing/2014/main" xmlns="" val="419171914"/>
+                    <a16:rowId xmlns:a16="http://schemas.microsoft.com/office/drawing/2014/main" val="419171914"/>
                   </a:ext>
                 </a:extLst>
               </a:tr>
@@ -11211,7 +11211,7 @@
                 </a:tc>
                 <a:extLst>
                   <a:ext uri="{0D108BD9-81ED-4DB2-BD59-A6C34878D82A}">
-                    <a16:rowId xmlns:a16="http://schemas.microsoft.com/office/drawing/2014/main" xmlns="" val="1434253989"/>
+                    <a16:rowId xmlns:a16="http://schemas.microsoft.com/office/drawing/2014/main" val="1434253989"/>
                   </a:ext>
                 </a:extLst>
               </a:tr>
@@ -11649,7 +11649,7 @@
                 </a:tc>
                 <a:extLst>
                   <a:ext uri="{0D108BD9-81ED-4DB2-BD59-A6C34878D82A}">
-                    <a16:rowId xmlns:a16="http://schemas.microsoft.com/office/drawing/2014/main" xmlns="" val="1123582624"/>
+                    <a16:rowId xmlns:a16="http://schemas.microsoft.com/office/drawing/2014/main" val="1123582624"/>
                   </a:ext>
                 </a:extLst>
               </a:tr>
@@ -12080,7 +12080,7 @@
                 </a:tc>
                 <a:extLst>
                   <a:ext uri="{0D108BD9-81ED-4DB2-BD59-A6C34878D82A}">
-                    <a16:rowId xmlns:a16="http://schemas.microsoft.com/office/drawing/2014/main" xmlns="" val="1194998983"/>
+                    <a16:rowId xmlns:a16="http://schemas.microsoft.com/office/drawing/2014/main" val="1194998983"/>
                   </a:ext>
                 </a:extLst>
               </a:tr>
@@ -12446,7 +12446,7 @@
                 </a:tc>
                 <a:extLst>
                   <a:ext uri="{0D108BD9-81ED-4DB2-BD59-A6C34878D82A}">
-                    <a16:rowId xmlns:a16="http://schemas.microsoft.com/office/drawing/2014/main" xmlns="" val="3886053095"/>
+                    <a16:rowId xmlns:a16="http://schemas.microsoft.com/office/drawing/2014/main" val="3886053095"/>
                   </a:ext>
                 </a:extLst>
               </a:tr>
@@ -12497,10 +12497,10 @@
           <p:cNvPr id="18" name="Straight Connector 17">
             <a:extLst>
               <a:ext uri="{FF2B5EF4-FFF2-40B4-BE49-F238E27FC236}">
-                <a16:creationId xmlns:a16="http://schemas.microsoft.com/office/drawing/2014/main" xmlns="" id="{D8689CE0-64D2-447C-9C1F-872D111D8AC3}"/>
+                <a16:creationId xmlns:a16="http://schemas.microsoft.com/office/drawing/2014/main" id="{D8689CE0-64D2-447C-9C1F-872D111D8AC3}"/>
               </a:ext>
               <a:ext uri="{C183D7F6-B498-43B3-948B-1728B52AA6E4}">
-                <adec:decorative xmlns:adec="http://schemas.microsoft.com/office/drawing/2017/decorative" xmlns="" val="1"/>
+                <adec:decorative xmlns:adec="http://schemas.microsoft.com/office/drawing/2017/decorative" val="1"/>
               </a:ext>
             </a:extLst>
           </p:cNvPr>
@@ -12549,10 +12549,10 @@
           <p:cNvPr id="19" name="Rectangle 18">
             <a:extLst>
               <a:ext uri="{FF2B5EF4-FFF2-40B4-BE49-F238E27FC236}">
-                <a16:creationId xmlns:a16="http://schemas.microsoft.com/office/drawing/2014/main" xmlns="" id="{511C99DC-C3C5-4EBE-91DD-345109C3D6E0}"/>
+                <a16:creationId xmlns:a16="http://schemas.microsoft.com/office/drawing/2014/main" id="{511C99DC-C3C5-4EBE-91DD-345109C3D6E0}"/>
               </a:ext>
               <a:ext uri="{C183D7F6-B498-43B3-948B-1728B52AA6E4}">
-                <adec:decorative xmlns:adec="http://schemas.microsoft.com/office/drawing/2017/decorative" xmlns="" val="1"/>
+                <adec:decorative xmlns:adec="http://schemas.microsoft.com/office/drawing/2017/decorative" val="1"/>
               </a:ext>
             </a:extLst>
           </p:cNvPr>
@@ -12625,7 +12625,7 @@
           <p:cNvPr id="2" name="Title 1">
             <a:extLst>
               <a:ext uri="{FF2B5EF4-FFF2-40B4-BE49-F238E27FC236}">
-                <a16:creationId xmlns:a16="http://schemas.microsoft.com/office/drawing/2014/main" xmlns="" id="{968D6353-BBA9-A2F8-C2D7-8637CC521370}"/>
+                <a16:creationId xmlns:a16="http://schemas.microsoft.com/office/drawing/2014/main" id="{968D6353-BBA9-A2F8-C2D7-8637CC521370}"/>
               </a:ext>
             </a:extLst>
           </p:cNvPr>
@@ -12660,10 +12660,10 @@
           <p:cNvPr id="20" name="Straight Connector 19">
             <a:extLst>
               <a:ext uri="{FF2B5EF4-FFF2-40B4-BE49-F238E27FC236}">
-                <a16:creationId xmlns:a16="http://schemas.microsoft.com/office/drawing/2014/main" xmlns="" id="{B0AA360F-DECB-4836-8FB6-22C4BC3FB02D}"/>
+                <a16:creationId xmlns:a16="http://schemas.microsoft.com/office/drawing/2014/main" id="{B0AA360F-DECB-4836-8FB6-22C4BC3FB02D}"/>
               </a:ext>
               <a:ext uri="{C183D7F6-B498-43B3-948B-1728B52AA6E4}">
-                <adec:decorative xmlns:adec="http://schemas.microsoft.com/office/drawing/2017/decorative" xmlns="" val="1"/>
+                <adec:decorative xmlns:adec="http://schemas.microsoft.com/office/drawing/2017/decorative" val="1"/>
               </a:ext>
             </a:extLst>
           </p:cNvPr>
@@ -12707,44 +12707,12 @@
           </a:fontRef>
         </p:style>
       </p:cxnSp>
-      <p:pic>
-        <p:nvPicPr>
-          <p:cNvPr id="7" name="Content Placeholder 6">
-            <a:extLst>
-              <a:ext uri="{FF2B5EF4-FFF2-40B4-BE49-F238E27FC236}">
-                <a16:creationId xmlns:a16="http://schemas.microsoft.com/office/drawing/2014/main" xmlns="" id="{D26730FA-9493-8064-E605-1521958E988E}"/>
-              </a:ext>
-            </a:extLst>
-          </p:cNvPr>
-          <p:cNvPicPr>
-            <a:picLocks noGrp="1" noChangeAspect="1"/>
-          </p:cNvPicPr>
-          <p:nvPr>
-            <p:ph idx="1"/>
-          </p:nvPr>
-        </p:nvPicPr>
-        <p:blipFill>
-          <a:blip r:embed="rId2"/>
-          <a:stretch>
-            <a:fillRect/>
-          </a:stretch>
-        </p:blipFill>
-        <p:spPr>
-          <a:xfrm>
-            <a:off x="6124791" y="917838"/>
-            <a:ext cx="6069273" cy="5022323"/>
-          </a:xfrm>
-          <a:prstGeom prst="rect">
-            <a:avLst/>
-          </a:prstGeom>
-        </p:spPr>
-      </p:pic>
       <p:grpSp>
         <p:nvGrpSpPr>
           <p:cNvPr id="59" name="Group 58">
             <a:extLst>
               <a:ext uri="{FF2B5EF4-FFF2-40B4-BE49-F238E27FC236}">
-                <a16:creationId xmlns:a16="http://schemas.microsoft.com/office/drawing/2014/main" xmlns="" id="{32BEB478-7B2C-B5AA-361C-439BB45EBF0D}"/>
+                <a16:creationId xmlns:a16="http://schemas.microsoft.com/office/drawing/2014/main" id="{32BEB478-7B2C-B5AA-361C-439BB45EBF0D}"/>
               </a:ext>
             </a:extLst>
           </p:cNvPr>
@@ -12764,7 +12732,7 @@
             <p:cNvPr id="15" name="Rectangle: Rounded Corners 14">
               <a:extLst>
                 <a:ext uri="{FF2B5EF4-FFF2-40B4-BE49-F238E27FC236}">
-                  <a16:creationId xmlns:a16="http://schemas.microsoft.com/office/drawing/2014/main" xmlns="" id="{C681A34F-A775-48AF-395C-198ED9C89C83}"/>
+                  <a16:creationId xmlns:a16="http://schemas.microsoft.com/office/drawing/2014/main" id="{C681A34F-A775-48AF-395C-198ED9C89C83}"/>
                 </a:ext>
               </a:extLst>
             </p:cNvPr>
@@ -12823,7 +12791,7 @@
             <p:cNvPr id="22" name="Rectangle: Rounded Corners 21">
               <a:extLst>
                 <a:ext uri="{FF2B5EF4-FFF2-40B4-BE49-F238E27FC236}">
-                  <a16:creationId xmlns:a16="http://schemas.microsoft.com/office/drawing/2014/main" xmlns="" id="{C6839303-D952-1F5D-9488-3999B1D87461}"/>
+                  <a16:creationId xmlns:a16="http://schemas.microsoft.com/office/drawing/2014/main" id="{C6839303-D952-1F5D-9488-3999B1D87461}"/>
                 </a:ext>
               </a:extLst>
             </p:cNvPr>
@@ -12882,7 +12850,7 @@
             <p:cNvPr id="23" name="Rectangle: Rounded Corners 22">
               <a:extLst>
                 <a:ext uri="{FF2B5EF4-FFF2-40B4-BE49-F238E27FC236}">
-                  <a16:creationId xmlns:a16="http://schemas.microsoft.com/office/drawing/2014/main" xmlns="" id="{61E8E379-2034-89C3-2E8B-1A1D83BE34D7}"/>
+                  <a16:creationId xmlns:a16="http://schemas.microsoft.com/office/drawing/2014/main" id="{61E8E379-2034-89C3-2E8B-1A1D83BE34D7}"/>
                 </a:ext>
               </a:extLst>
             </p:cNvPr>
@@ -12941,7 +12909,7 @@
             <p:cNvPr id="25" name="Connector: Elbow 24">
               <a:extLst>
                 <a:ext uri="{FF2B5EF4-FFF2-40B4-BE49-F238E27FC236}">
-                  <a16:creationId xmlns:a16="http://schemas.microsoft.com/office/drawing/2014/main" xmlns="" id="{B669BA5B-17F3-AC3E-4566-C35BBE8740B0}"/>
+                  <a16:creationId xmlns:a16="http://schemas.microsoft.com/office/drawing/2014/main" id="{B669BA5B-17F3-AC3E-4566-C35BBE8740B0}"/>
                 </a:ext>
               </a:extLst>
             </p:cNvPr>
@@ -12986,7 +12954,7 @@
             <p:cNvPr id="29" name="Connector: Elbow 28">
               <a:extLst>
                 <a:ext uri="{FF2B5EF4-FFF2-40B4-BE49-F238E27FC236}">
-                  <a16:creationId xmlns:a16="http://schemas.microsoft.com/office/drawing/2014/main" xmlns="" id="{37561D97-AB9E-B7B5-5DEB-68B171D8A0F8}"/>
+                  <a16:creationId xmlns:a16="http://schemas.microsoft.com/office/drawing/2014/main" id="{37561D97-AB9E-B7B5-5DEB-68B171D8A0F8}"/>
                 </a:ext>
               </a:extLst>
             </p:cNvPr>
@@ -13031,7 +12999,7 @@
             <p:cNvPr id="42" name="Rectangle: Rounded Corners 41">
               <a:extLst>
                 <a:ext uri="{FF2B5EF4-FFF2-40B4-BE49-F238E27FC236}">
-                  <a16:creationId xmlns:a16="http://schemas.microsoft.com/office/drawing/2014/main" xmlns="" id="{AE2283B3-D37D-B246-F857-37D929546B29}"/>
+                  <a16:creationId xmlns:a16="http://schemas.microsoft.com/office/drawing/2014/main" id="{AE2283B3-D37D-B246-F857-37D929546B29}"/>
                 </a:ext>
               </a:extLst>
             </p:cNvPr>
@@ -13090,7 +13058,7 @@
             <p:cNvPr id="44" name="Rectangle: Rounded Corners 43">
               <a:extLst>
                 <a:ext uri="{FF2B5EF4-FFF2-40B4-BE49-F238E27FC236}">
-                  <a16:creationId xmlns:a16="http://schemas.microsoft.com/office/drawing/2014/main" xmlns="" id="{51AF818C-5E75-7A82-9B45-14DE8A7E3248}"/>
+                  <a16:creationId xmlns:a16="http://schemas.microsoft.com/office/drawing/2014/main" id="{51AF818C-5E75-7A82-9B45-14DE8A7E3248}"/>
                 </a:ext>
               </a:extLst>
             </p:cNvPr>
@@ -13149,7 +13117,7 @@
             <p:cNvPr id="45" name="Rectangle: Rounded Corners 44">
               <a:extLst>
                 <a:ext uri="{FF2B5EF4-FFF2-40B4-BE49-F238E27FC236}">
-                  <a16:creationId xmlns:a16="http://schemas.microsoft.com/office/drawing/2014/main" xmlns="" id="{7F239603-F751-D90F-1E88-F79E48FB9A9E}"/>
+                  <a16:creationId xmlns:a16="http://schemas.microsoft.com/office/drawing/2014/main" id="{7F239603-F751-D90F-1E88-F79E48FB9A9E}"/>
                 </a:ext>
               </a:extLst>
             </p:cNvPr>
@@ -13208,7 +13176,7 @@
             <p:cNvPr id="46" name="Rectangle: Rounded Corners 45">
               <a:extLst>
                 <a:ext uri="{FF2B5EF4-FFF2-40B4-BE49-F238E27FC236}">
-                  <a16:creationId xmlns:a16="http://schemas.microsoft.com/office/drawing/2014/main" xmlns="" id="{6EC5FFA4-2F35-93FA-C77E-5E2F4F5CD520}"/>
+                  <a16:creationId xmlns:a16="http://schemas.microsoft.com/office/drawing/2014/main" id="{6EC5FFA4-2F35-93FA-C77E-5E2F4F5CD520}"/>
                 </a:ext>
               </a:extLst>
             </p:cNvPr>
@@ -13267,7 +13235,7 @@
             <p:cNvPr id="48" name="Straight Connector 47">
               <a:extLst>
                 <a:ext uri="{FF2B5EF4-FFF2-40B4-BE49-F238E27FC236}">
-                  <a16:creationId xmlns:a16="http://schemas.microsoft.com/office/drawing/2014/main" xmlns="" id="{1A6D58AE-A5B7-555A-66B5-8BCDE1909311}"/>
+                  <a16:creationId xmlns:a16="http://schemas.microsoft.com/office/drawing/2014/main" id="{1A6D58AE-A5B7-555A-66B5-8BCDE1909311}"/>
                 </a:ext>
               </a:extLst>
             </p:cNvPr>
@@ -13311,7 +13279,7 @@
             <p:cNvPr id="50" name="Straight Connector 49">
               <a:extLst>
                 <a:ext uri="{FF2B5EF4-FFF2-40B4-BE49-F238E27FC236}">
-                  <a16:creationId xmlns:a16="http://schemas.microsoft.com/office/drawing/2014/main" xmlns="" id="{60690DBE-22DA-EF78-54E4-5A658FC07E84}"/>
+                  <a16:creationId xmlns:a16="http://schemas.microsoft.com/office/drawing/2014/main" id="{60690DBE-22DA-EF78-54E4-5A658FC07E84}"/>
                 </a:ext>
               </a:extLst>
             </p:cNvPr>
@@ -13355,7 +13323,7 @@
             <p:cNvPr id="52" name="Straight Connector 51">
               <a:extLst>
                 <a:ext uri="{FF2B5EF4-FFF2-40B4-BE49-F238E27FC236}">
-                  <a16:creationId xmlns:a16="http://schemas.microsoft.com/office/drawing/2014/main" xmlns="" id="{E5CBC33F-8A28-51AA-6452-A0680DA66EFC}"/>
+                  <a16:creationId xmlns:a16="http://schemas.microsoft.com/office/drawing/2014/main" id="{E5CBC33F-8A28-51AA-6452-A0680DA66EFC}"/>
                 </a:ext>
               </a:extLst>
             </p:cNvPr>
@@ -13399,7 +13367,7 @@
             <p:cNvPr id="54" name="Straight Connector 53">
               <a:extLst>
                 <a:ext uri="{FF2B5EF4-FFF2-40B4-BE49-F238E27FC236}">
-                  <a16:creationId xmlns:a16="http://schemas.microsoft.com/office/drawing/2014/main" xmlns="" id="{A7EE3A38-732F-56AA-45D8-DF9CF9A9AF66}"/>
+                  <a16:creationId xmlns:a16="http://schemas.microsoft.com/office/drawing/2014/main" id="{A7EE3A38-732F-56AA-45D8-DF9CF9A9AF66}"/>
                 </a:ext>
               </a:extLst>
             </p:cNvPr>
@@ -13443,7 +13411,7 @@
             <p:cNvPr id="57" name="TextBox 56">
               <a:extLst>
                 <a:ext uri="{FF2B5EF4-FFF2-40B4-BE49-F238E27FC236}">
-                  <a16:creationId xmlns:a16="http://schemas.microsoft.com/office/drawing/2014/main" xmlns="" id="{82EA4BF9-FE09-F708-02A9-FC7EC758B3DF}"/>
+                  <a16:creationId xmlns:a16="http://schemas.microsoft.com/office/drawing/2014/main" id="{82EA4BF9-FE09-F708-02A9-FC7EC758B3DF}"/>
                 </a:ext>
               </a:extLst>
             </p:cNvPr>
@@ -13495,7 +13463,7 @@
             <p:cNvPr id="58" name="TextBox 57">
               <a:extLst>
                 <a:ext uri="{FF2B5EF4-FFF2-40B4-BE49-F238E27FC236}">
-                  <a16:creationId xmlns:a16="http://schemas.microsoft.com/office/drawing/2014/main" xmlns="" id="{DBE9BCD3-4FFE-E08C-7751-8851B2B38160}"/>
+                  <a16:creationId xmlns:a16="http://schemas.microsoft.com/office/drawing/2014/main" id="{DBE9BCD3-4FFE-E08C-7751-8851B2B38160}"/>
                 </a:ext>
               </a:extLst>
             </p:cNvPr>
@@ -13543,6 +13511,35 @@
           </p:txBody>
         </p:sp>
       </p:grpSp>
+      <p:pic>
+        <p:nvPicPr>
+          <p:cNvPr id="6" name="Content Placeholder 5">
+            <a:extLst>
+              <a:ext uri="{FF2B5EF4-FFF2-40B4-BE49-F238E27FC236}">
+                <a16:creationId xmlns:a16="http://schemas.microsoft.com/office/drawing/2014/main" id="{B5E42CE9-1965-5F01-9B34-F117CBDCE95F}"/>
+              </a:ext>
+            </a:extLst>
+          </p:cNvPr>
+          <p:cNvPicPr>
+            <a:picLocks noGrp="1" noChangeAspect="1"/>
+          </p:cNvPicPr>
+          <p:nvPr>
+            <p:ph idx="1"/>
+          </p:nvPr>
+        </p:nvPicPr>
+        <p:blipFill>
+          <a:blip r:embed="rId2"/>
+          <a:stretch>
+            <a:fillRect/>
+          </a:stretch>
+        </p:blipFill>
+        <p:spPr>
+          <a:xfrm>
+            <a:off x="6268374" y="325788"/>
+            <a:ext cx="5259680" cy="6206424"/>
+          </a:xfrm>
+        </p:spPr>
+      </p:pic>
     </p:spTree>
     <p:extLst>
       <p:ext uri="{BB962C8B-B14F-4D97-AF65-F5344CB8AC3E}">
@@ -13580,7 +13577,7 @@
               <p:cNvPr id="2" name="Title 1">
                 <a:extLst>
                   <a:ext uri="{FF2B5EF4-FFF2-40B4-BE49-F238E27FC236}">
-                    <a16:creationId xmlns:a16="http://schemas.microsoft.com/office/drawing/2014/main" xmlns="" id="{8A576E17-5150-866D-1369-FC5231447BC6}"/>
+                    <a16:creationId xmlns:a16="http://schemas.microsoft.com/office/drawing/2014/main" id="{8A576E17-5150-866D-1369-FC5231447BC6}"/>
                   </a:ext>
                 </a:extLst>
               </p:cNvPr>
@@ -13625,7 +13622,7 @@
                         <m:endChr m:val="]"/>
                         <m:ctrlPr>
                           <a:rPr lang="en-US" b="1" i="1" smtClean="0">
-                            <a:latin typeface="Cambria Math" charset="0"/>
+                            <a:latin typeface="Cambria Math" panose="02040503050406030204" pitchFamily="18" charset="0"/>
                           </a:rPr>
                         </m:ctrlPr>
                       </m:dPr>
@@ -13656,7 +13653,7 @@
                         <m:endChr m:val="]"/>
                         <m:ctrlPr>
                           <a:rPr lang="en-US" b="1" i="1" smtClean="0">
-                            <a:latin typeface="Cambria Math" charset="0"/>
+                            <a:latin typeface="Cambria Math" panose="02040503050406030204" pitchFamily="18" charset="0"/>
                           </a:rPr>
                         </m:ctrlPr>
                       </m:dPr>
@@ -13825,7 +13822,7 @@
               <p:cNvPr id="2" name="Title 1">
                 <a:extLst>
                   <a:ext uri="{FF2B5EF4-FFF2-40B4-BE49-F238E27FC236}">
-                    <a16:creationId xmlns:a16="http://schemas.microsoft.com/office/drawing/2014/main" xmlns="" id="{8A576E17-5150-866D-1369-FC5231447BC6}"/>
+                    <a16:creationId xmlns:a16="http://schemas.microsoft.com/office/drawing/2014/main" id="{8A576E17-5150-866D-1369-FC5231447BC6}"/>
                   </a:ext>
                 </a:extLst>
               </p:cNvPr>
@@ -13870,7 +13867,7 @@
                         <m:endChr m:val="]"/>
                         <m:ctrlPr>
                           <a:rPr lang="en-US" b="1" i="1" smtClean="0">
-                            <a:latin typeface="Cambria Math" charset="0"/>
+                            <a:latin typeface="Cambria Math" panose="02040503050406030204" pitchFamily="18" charset="0"/>
                           </a:rPr>
                         </m:ctrlPr>
                       </m:dPr>
@@ -13905,7 +13902,7 @@
                       <m:sSubPr>
                         <m:ctrlPr>
                           <a:rPr lang="en-US" b="1" i="1" smtClean="0">
-                            <a:latin typeface="Cambria Math" charset="0"/>
+                            <a:latin typeface="Cambria Math" panose="02040503050406030204" pitchFamily="18" charset="0"/>
                           </a:rPr>
                         </m:ctrlPr>
                       </m:sSubPr>
@@ -14080,7 +14077,7 @@
           <p:cNvPr id="2" name="Title 1">
             <a:extLst>
               <a:ext uri="{FF2B5EF4-FFF2-40B4-BE49-F238E27FC236}">
-                <a16:creationId xmlns:a16="http://schemas.microsoft.com/office/drawing/2014/main" xmlns="" id="{8A576E17-5150-866D-1369-FC5231447BC6}"/>
+                <a16:creationId xmlns:a16="http://schemas.microsoft.com/office/drawing/2014/main" id="{8A576E17-5150-866D-1369-FC5231447BC6}"/>
               </a:ext>
             </a:extLst>
           </p:cNvPr>
@@ -14202,7 +14199,7 @@
           <p:cNvPr id="2" name="Title 1">
             <a:extLst>
               <a:ext uri="{FF2B5EF4-FFF2-40B4-BE49-F238E27FC236}">
-                <a16:creationId xmlns:a16="http://schemas.microsoft.com/office/drawing/2014/main" xmlns="" id="{8A576E17-5150-866D-1369-FC5231447BC6}"/>
+                <a16:creationId xmlns:a16="http://schemas.microsoft.com/office/drawing/2014/main" id="{8A576E17-5150-866D-1369-FC5231447BC6}"/>
               </a:ext>
             </a:extLst>
           </p:cNvPr>
@@ -14324,7 +14321,7 @@
           <p:cNvPr id="2" name="Title 1">
             <a:extLst>
               <a:ext uri="{FF2B5EF4-FFF2-40B4-BE49-F238E27FC236}">
-                <a16:creationId xmlns:a16="http://schemas.microsoft.com/office/drawing/2014/main" xmlns="" id="{8A576E17-5150-866D-1369-FC5231447BC6}"/>
+                <a16:creationId xmlns:a16="http://schemas.microsoft.com/office/drawing/2014/main" id="{8A576E17-5150-866D-1369-FC5231447BC6}"/>
               </a:ext>
             </a:extLst>
           </p:cNvPr>
@@ -14446,7 +14443,7 @@
           <p:cNvPr id="2" name="Title 1">
             <a:extLst>
               <a:ext uri="{FF2B5EF4-FFF2-40B4-BE49-F238E27FC236}">
-                <a16:creationId xmlns:a16="http://schemas.microsoft.com/office/drawing/2014/main" xmlns="" id="{8A576E17-5150-866D-1369-FC5231447BC6}"/>
+                <a16:creationId xmlns:a16="http://schemas.microsoft.com/office/drawing/2014/main" id="{8A576E17-5150-866D-1369-FC5231447BC6}"/>
               </a:ext>
             </a:extLst>
           </p:cNvPr>
@@ -14481,7 +14478,7 @@
               <p:cNvPr id="3" name="Content Placeholder 2">
                 <a:extLst>
                   <a:ext uri="{FF2B5EF4-FFF2-40B4-BE49-F238E27FC236}">
-                    <a16:creationId xmlns:a16="http://schemas.microsoft.com/office/drawing/2014/main" xmlns="" id="{4436D6E8-3870-F4FD-BC1F-EE5755A0AD11}"/>
+                    <a16:creationId xmlns:a16="http://schemas.microsoft.com/office/drawing/2014/main" id="{4436D6E8-3870-F4FD-BC1F-EE5755A0AD11}"/>
                   </a:ext>
                 </a:extLst>
               </p:cNvPr>
@@ -14566,7 +14563,7 @@
                         <m:endChr m:val="]"/>
                         <m:ctrlPr>
                           <a:rPr lang="en-US" sz="2800" b="0" i="1" smtClean="0">
-                            <a:latin typeface="Cambria Math" charset="0"/>
+                            <a:latin typeface="Cambria Math" panose="02040503050406030204" pitchFamily="18" charset="0"/>
                           </a:rPr>
                         </m:ctrlPr>
                       </m:dPr>
@@ -14597,7 +14594,7 @@
                         <m:endChr m:val="]"/>
                         <m:ctrlPr>
                           <a:rPr lang="en-US" sz="2800" b="0" i="1" smtClean="0">
-                            <a:latin typeface="Cambria Math" charset="0"/>
+                            <a:latin typeface="Cambria Math" panose="02040503050406030204" pitchFamily="18" charset="0"/>
                           </a:rPr>
                         </m:ctrlPr>
                       </m:dPr>
@@ -14628,7 +14625,7 @@
                         <m:endChr m:val="]"/>
                         <m:ctrlPr>
                           <a:rPr lang="en-US" sz="2800" b="0" i="1" smtClean="0">
-                            <a:latin typeface="Cambria Math" charset="0"/>
+                            <a:latin typeface="Cambria Math" panose="02040503050406030204" pitchFamily="18" charset="0"/>
                           </a:rPr>
                         </m:ctrlPr>
                       </m:dPr>
@@ -14671,7 +14668,7 @@
                       <m:sSubPr>
                         <m:ctrlPr>
                           <a:rPr lang="en-US" sz="2800" b="0" i="1" smtClean="0">
-                            <a:latin typeface="Cambria Math" charset="0"/>
+                            <a:latin typeface="Cambria Math" panose="02040503050406030204" pitchFamily="18" charset="0"/>
                           </a:rPr>
                         </m:ctrlPr>
                       </m:sSubPr>
@@ -14806,7 +14803,7 @@
           <p:cNvPr id="2" name="Title 1">
             <a:extLst>
               <a:ext uri="{FF2B5EF4-FFF2-40B4-BE49-F238E27FC236}">
-                <a16:creationId xmlns:a16="http://schemas.microsoft.com/office/drawing/2014/main" xmlns="" id="{8A576E17-5150-866D-1369-FC5231447BC6}"/>
+                <a16:creationId xmlns:a16="http://schemas.microsoft.com/office/drawing/2014/main" id="{8A576E17-5150-866D-1369-FC5231447BC6}"/>
               </a:ext>
             </a:extLst>
           </p:cNvPr>
@@ -14928,7 +14925,7 @@
           <p:cNvPr id="2" name="Title 1">
             <a:extLst>
               <a:ext uri="{FF2B5EF4-FFF2-40B4-BE49-F238E27FC236}">
-                <a16:creationId xmlns:a16="http://schemas.microsoft.com/office/drawing/2014/main" xmlns="" id="{8A576E17-5150-866D-1369-FC5231447BC6}"/>
+                <a16:creationId xmlns:a16="http://schemas.microsoft.com/office/drawing/2014/main" id="{8A576E17-5150-866D-1369-FC5231447BC6}"/>
               </a:ext>
             </a:extLst>
           </p:cNvPr>
@@ -15050,7 +15047,7 @@
           <p:cNvPr id="2" name="Title 1">
             <a:extLst>
               <a:ext uri="{FF2B5EF4-FFF2-40B4-BE49-F238E27FC236}">
-                <a16:creationId xmlns:a16="http://schemas.microsoft.com/office/drawing/2014/main" xmlns="" id="{8A576E17-5150-866D-1369-FC5231447BC6}"/>
+                <a16:creationId xmlns:a16="http://schemas.microsoft.com/office/drawing/2014/main" id="{8A576E17-5150-866D-1369-FC5231447BC6}"/>
               </a:ext>
             </a:extLst>
           </p:cNvPr>
@@ -15172,7 +15169,7 @@
           <p:cNvPr id="2" name="Title 1">
             <a:extLst>
               <a:ext uri="{FF2B5EF4-FFF2-40B4-BE49-F238E27FC236}">
-                <a16:creationId xmlns:a16="http://schemas.microsoft.com/office/drawing/2014/main" xmlns="" id="{8A576E17-5150-866D-1369-FC5231447BC6}"/>
+                <a16:creationId xmlns:a16="http://schemas.microsoft.com/office/drawing/2014/main" id="{8A576E17-5150-866D-1369-FC5231447BC6}"/>
               </a:ext>
             </a:extLst>
           </p:cNvPr>
@@ -15294,7 +15291,7 @@
           <p:cNvPr id="2" name="Title 1">
             <a:extLst>
               <a:ext uri="{FF2B5EF4-FFF2-40B4-BE49-F238E27FC236}">
-                <a16:creationId xmlns:a16="http://schemas.microsoft.com/office/drawing/2014/main" xmlns="" id="{8A576E17-5150-866D-1369-FC5231447BC6}"/>
+                <a16:creationId xmlns:a16="http://schemas.microsoft.com/office/drawing/2014/main" id="{8A576E17-5150-866D-1369-FC5231447BC6}"/>
               </a:ext>
             </a:extLst>
           </p:cNvPr>
@@ -15416,7 +15413,7 @@
           <p:cNvPr id="2" name="Title 1">
             <a:extLst>
               <a:ext uri="{FF2B5EF4-FFF2-40B4-BE49-F238E27FC236}">
-                <a16:creationId xmlns:a16="http://schemas.microsoft.com/office/drawing/2014/main" xmlns="" id="{8A576E17-5150-866D-1369-FC5231447BC6}"/>
+                <a16:creationId xmlns:a16="http://schemas.microsoft.com/office/drawing/2014/main" id="{8A576E17-5150-866D-1369-FC5231447BC6}"/>
               </a:ext>
             </a:extLst>
           </p:cNvPr>
@@ -15538,7 +15535,7 @@
           <p:cNvPr id="2" name="Title 1">
             <a:extLst>
               <a:ext uri="{FF2B5EF4-FFF2-40B4-BE49-F238E27FC236}">
-                <a16:creationId xmlns:a16="http://schemas.microsoft.com/office/drawing/2014/main" xmlns="" id="{8A576E17-5150-866D-1369-FC5231447BC6}"/>
+                <a16:creationId xmlns:a16="http://schemas.microsoft.com/office/drawing/2014/main" id="{8A576E17-5150-866D-1369-FC5231447BC6}"/>
               </a:ext>
             </a:extLst>
           </p:cNvPr>
@@ -15660,7 +15657,7 @@
           <p:cNvPr id="2" name="Title 1">
             <a:extLst>
               <a:ext uri="{FF2B5EF4-FFF2-40B4-BE49-F238E27FC236}">
-                <a16:creationId xmlns:a16="http://schemas.microsoft.com/office/drawing/2014/main" xmlns="" id="{8A576E17-5150-866D-1369-FC5231447BC6}"/>
+                <a16:creationId xmlns:a16="http://schemas.microsoft.com/office/drawing/2014/main" id="{8A576E17-5150-866D-1369-FC5231447BC6}"/>
               </a:ext>
             </a:extLst>
           </p:cNvPr>
@@ -15782,7 +15779,7 @@
           <p:cNvPr id="2" name="Title 1">
             <a:extLst>
               <a:ext uri="{FF2B5EF4-FFF2-40B4-BE49-F238E27FC236}">
-                <a16:creationId xmlns:a16="http://schemas.microsoft.com/office/drawing/2014/main" xmlns="" id="{8A576E17-5150-866D-1369-FC5231447BC6}"/>
+                <a16:creationId xmlns:a16="http://schemas.microsoft.com/office/drawing/2014/main" id="{8A576E17-5150-866D-1369-FC5231447BC6}"/>
               </a:ext>
             </a:extLst>
           </p:cNvPr>
@@ -15904,7 +15901,7 @@
           <p:cNvPr id="2" name="Title 1">
             <a:extLst>
               <a:ext uri="{FF2B5EF4-FFF2-40B4-BE49-F238E27FC236}">
-                <a16:creationId xmlns:a16="http://schemas.microsoft.com/office/drawing/2014/main" xmlns="" id="{8A576E17-5150-866D-1369-FC5231447BC6}"/>
+                <a16:creationId xmlns:a16="http://schemas.microsoft.com/office/drawing/2014/main" id="{8A576E17-5150-866D-1369-FC5231447BC6}"/>
               </a:ext>
             </a:extLst>
           </p:cNvPr>
@@ -16026,7 +16023,7 @@
           <p:cNvPr id="2" name="Title 1">
             <a:extLst>
               <a:ext uri="{FF2B5EF4-FFF2-40B4-BE49-F238E27FC236}">
-                <a16:creationId xmlns:a16="http://schemas.microsoft.com/office/drawing/2014/main" xmlns="" id="{8A576E17-5150-866D-1369-FC5231447BC6}"/>
+                <a16:creationId xmlns:a16="http://schemas.microsoft.com/office/drawing/2014/main" id="{8A576E17-5150-866D-1369-FC5231447BC6}"/>
               </a:ext>
             </a:extLst>
           </p:cNvPr>
@@ -16208,7 +16205,7 @@
                       <m:fPr>
                         <m:ctrlPr>
                           <a:rPr lang="en-US" sz="2400" b="0" i="1" smtClean="0">
-                            <a:latin typeface="Cambria Math" charset="0"/>
+                            <a:latin typeface="Cambria Math" panose="02040503050406030204" pitchFamily="18" charset="0"/>
                           </a:rPr>
                         </m:ctrlPr>
                       </m:fPr>
@@ -16324,7 +16321,7 @@
           <p:cNvPr id="2" name="Title 1">
             <a:extLst>
               <a:ext uri="{FF2B5EF4-FFF2-40B4-BE49-F238E27FC236}">
-                <a16:creationId xmlns:a16="http://schemas.microsoft.com/office/drawing/2014/main" xmlns="" id="{8A576E17-5150-866D-1369-FC5231447BC6}"/>
+                <a16:creationId xmlns:a16="http://schemas.microsoft.com/office/drawing/2014/main" id="{8A576E17-5150-866D-1369-FC5231447BC6}"/>
               </a:ext>
             </a:extLst>
           </p:cNvPr>
@@ -16446,7 +16443,7 @@
           <p:cNvPr id="2" name="Title 1">
             <a:extLst>
               <a:ext uri="{FF2B5EF4-FFF2-40B4-BE49-F238E27FC236}">
-                <a16:creationId xmlns:a16="http://schemas.microsoft.com/office/drawing/2014/main" xmlns="" id="{8A576E17-5150-866D-1369-FC5231447BC6}"/>
+                <a16:creationId xmlns:a16="http://schemas.microsoft.com/office/drawing/2014/main" id="{8A576E17-5150-866D-1369-FC5231447BC6}"/>
               </a:ext>
             </a:extLst>
           </p:cNvPr>
@@ -16568,7 +16565,7 @@
           <p:cNvPr id="2" name="Title 1">
             <a:extLst>
               <a:ext uri="{FF2B5EF4-FFF2-40B4-BE49-F238E27FC236}">
-                <a16:creationId xmlns:a16="http://schemas.microsoft.com/office/drawing/2014/main" xmlns="" id="{8A576E17-5150-866D-1369-FC5231447BC6}"/>
+                <a16:creationId xmlns:a16="http://schemas.microsoft.com/office/drawing/2014/main" id="{8A576E17-5150-866D-1369-FC5231447BC6}"/>
               </a:ext>
             </a:extLst>
           </p:cNvPr>
@@ -16690,7 +16687,7 @@
           <p:cNvPr id="2" name="Title 1">
             <a:extLst>
               <a:ext uri="{FF2B5EF4-FFF2-40B4-BE49-F238E27FC236}">
-                <a16:creationId xmlns:a16="http://schemas.microsoft.com/office/drawing/2014/main" xmlns="" id="{8A576E17-5150-866D-1369-FC5231447BC6}"/>
+                <a16:creationId xmlns:a16="http://schemas.microsoft.com/office/drawing/2014/main" id="{8A576E17-5150-866D-1369-FC5231447BC6}"/>
               </a:ext>
             </a:extLst>
           </p:cNvPr>
@@ -16782,7 +16779,7 @@
           <p:cNvPr id="2" name="Title 1">
             <a:extLst>
               <a:ext uri="{FF2B5EF4-FFF2-40B4-BE49-F238E27FC236}">
-                <a16:creationId xmlns:a16="http://schemas.microsoft.com/office/drawing/2014/main" xmlns="" id="{8A576E17-5150-866D-1369-FC5231447BC6}"/>
+                <a16:creationId xmlns:a16="http://schemas.microsoft.com/office/drawing/2014/main" id="{8A576E17-5150-866D-1369-FC5231447BC6}"/>
               </a:ext>
             </a:extLst>
           </p:cNvPr>
@@ -16911,7 +16908,7 @@
           <p:cNvPr id="2" name="Title 1">
             <a:extLst>
               <a:ext uri="{FF2B5EF4-FFF2-40B4-BE49-F238E27FC236}">
-                <a16:creationId xmlns:a16="http://schemas.microsoft.com/office/drawing/2014/main" xmlns="" id="{8A576E17-5150-866D-1369-FC5231447BC6}"/>
+                <a16:creationId xmlns:a16="http://schemas.microsoft.com/office/drawing/2014/main" id="{8A576E17-5150-866D-1369-FC5231447BC6}"/>
               </a:ext>
             </a:extLst>
           </p:cNvPr>
@@ -16934,14 +16931,14 @@
           </a:p>
         </p:txBody>
       </p:sp>
-      <mc:AlternateContent xmlns:mc="http://schemas.openxmlformats.org/markup-compatibility/2006">
-        <mc:Choice xmlns:a14="http://schemas.microsoft.com/office/drawing/2010/main" Requires="a14">
+      <mc:AlternateContent xmlns:mc="http://schemas.openxmlformats.org/markup-compatibility/2006" xmlns:a14="http://schemas.microsoft.com/office/drawing/2010/main">
+        <mc:Choice Requires="a14">
           <p:sp>
             <p:nvSpPr>
               <p:cNvPr id="3" name="Content Placeholder 2">
                 <a:extLst>
                   <a:ext uri="{FF2B5EF4-FFF2-40B4-BE49-F238E27FC236}">
-                    <a16:creationId xmlns:a16="http://schemas.microsoft.com/office/drawing/2014/main" xmlns="" id="{4436D6E8-3870-F4FD-BC1F-EE5755A0AD11}"/>
+                    <a16:creationId xmlns:a16="http://schemas.microsoft.com/office/drawing/2014/main" id="{4436D6E8-3870-F4FD-BC1F-EE5755A0AD11}"/>
                   </a:ext>
                 </a:extLst>
               </p:cNvPr>
@@ -16965,7 +16962,7 @@
               <a:lstStyle/>
               <a:p>
                 <a:r>
-                  <a:rPr lang="en-US" dirty="0" smtClean="0"/>
+                  <a:rPr lang="en-US" dirty="0"/>
                   <a:t>Initial parameters needed: </a:t>
                 </a:r>
               </a:p>
@@ -17012,7 +17009,7 @@
                       <m:fPr>
                         <m:ctrlPr>
                           <a:rPr lang="en-US" i="1" smtClean="0">
-                            <a:latin typeface="Cambria Math" charset="0"/>
+                            <a:latin typeface="Cambria Math" panose="02040503050406030204" pitchFamily="18" charset="0"/>
                             <a:cs typeface="Calibri" panose="020F0502020204030204" pitchFamily="34" charset="0"/>
                           </a:rPr>
                         </m:ctrlPr>
@@ -17067,12 +17064,8 @@
               </a:p>
               <a:p>
                 <a:r>
-                  <a:rPr lang="en-US" dirty="0" smtClean="0"/>
-                  <a:t>Inter Arrival Times are </a:t>
-                </a:r>
-                <a:r>
                   <a:rPr lang="en-US" dirty="0"/>
-                  <a:t>randomly sample from an exponential distribution with average </a:t>
+                  <a:t>Inter Arrival Times are randomly sample from an exponential distribution with average </a:t>
                 </a:r>
                 <a14:m>
                   <m:oMath xmlns:m="http://schemas.openxmlformats.org/officeDocument/2006/math">
@@ -17091,19 +17084,14 @@
                   </m:oMath>
                 </a14:m>
                 <a:r>
-                  <a:rPr lang="en-US" dirty="0" smtClean="0"/>
+                  <a:rPr lang="en-US" dirty="0"/>
                   <a:t>.</a:t>
                 </a:r>
-                <a:endParaRPr lang="en-US" dirty="0"/>
               </a:p>
               <a:p>
                 <a:r>
                   <a:rPr lang="en-US" dirty="0"/>
-                  <a:t>Service </a:t>
-                </a:r>
-                <a:r>
-                  <a:rPr lang="en-US" dirty="0" smtClean="0"/>
-                  <a:t>Times are randomly sample from an exponential distribution with average </a:t>
+                  <a:t>Service Times are randomly sample from an exponential distribution with average </a:t>
                 </a:r>
                 <a14:m>
                   <m:oMath xmlns:m="http://schemas.openxmlformats.org/officeDocument/2006/math">
@@ -17122,29 +17110,20 @@
                   </m:oMath>
                 </a14:m>
                 <a:r>
-                  <a:rPr lang="en-US" dirty="0" smtClean="0"/>
+                  <a:rPr lang="en-US" dirty="0"/>
                   <a:t>.</a:t>
                 </a:r>
-                <a:endParaRPr lang="en-US" dirty="0"/>
               </a:p>
               <a:p>
                 <a:r>
                   <a:rPr lang="en-US" dirty="0"/>
-                  <a:t>The simulation code will therefore calculate departure times for a </a:t>
-                </a:r>
-                <a:r>
-                  <a:rPr lang="en-US" dirty="0" smtClean="0"/>
-                  <a:t>multi-servers </a:t>
-                </a:r>
-                <a:r>
-                  <a:rPr lang="en-US" dirty="0"/>
-                  <a:t>queue system.</a:t>
+                  <a:t>The simulation code will therefore calculate departure times for a multi-servers queue system.</a:t>
                 </a:r>
               </a:p>
             </p:txBody>
           </p:sp>
         </mc:Choice>
-        <mc:Fallback>
+        <mc:Fallback xmlns="">
           <p:sp>
             <p:nvSpPr>
               <p:cNvPr id="3" name="Content Placeholder 2">
@@ -17193,7 +17172,7 @@
           <p:cNvPr id="5" name="Picture 4">
             <a:extLst>
               <a:ext uri="{FF2B5EF4-FFF2-40B4-BE49-F238E27FC236}">
-                <a16:creationId xmlns:a16="http://schemas.microsoft.com/office/drawing/2014/main" xmlns="" id="{AB5B977F-6E22-AA84-E75F-9990093B8086}"/>
+                <a16:creationId xmlns:a16="http://schemas.microsoft.com/office/drawing/2014/main" id="{AB5B977F-6E22-AA84-E75F-9990093B8086}"/>
               </a:ext>
             </a:extLst>
           </p:cNvPr>
@@ -17223,7 +17202,7 @@
           <p:cNvPr id="7" name="Picture 6">
             <a:extLst>
               <a:ext uri="{FF2B5EF4-FFF2-40B4-BE49-F238E27FC236}">
-                <a16:creationId xmlns:a16="http://schemas.microsoft.com/office/drawing/2014/main" xmlns="" id="{A7F512D3-739D-02FF-AF17-29B3CE53A4C1}"/>
+                <a16:creationId xmlns:a16="http://schemas.microsoft.com/office/drawing/2014/main" id="{A7F512D3-739D-02FF-AF17-29B3CE53A4C1}"/>
               </a:ext>
             </a:extLst>
           </p:cNvPr>
@@ -17258,13 +17237,6 @@
   <p:clrMapOvr>
     <a:masterClrMapping/>
   </p:clrMapOvr>
-  <p:timing>
-    <p:tnLst>
-      <p:par>
-        <p:cTn id="1" dur="indefinite" restart="never" nodeType="tmRoot"/>
-      </p:par>
-    </p:tnLst>
-  </p:timing>
 </p:sld>
 </file>
 
@@ -17290,7 +17262,7 @@
           <p:cNvPr id="2" name="Title 1">
             <a:extLst>
               <a:ext uri="{FF2B5EF4-FFF2-40B4-BE49-F238E27FC236}">
-                <a16:creationId xmlns:a16="http://schemas.microsoft.com/office/drawing/2014/main" xmlns="" id="{9182B811-727A-79E2-BB7B-B5CF84A77D10}"/>
+                <a16:creationId xmlns:a16="http://schemas.microsoft.com/office/drawing/2014/main" id="{9182B811-727A-79E2-BB7B-B5CF84A77D10}"/>
               </a:ext>
             </a:extLst>
           </p:cNvPr>
@@ -17325,7 +17297,7 @@
           <p:cNvPr id="3" name="Content Placeholder 2">
             <a:extLst>
               <a:ext uri="{FF2B5EF4-FFF2-40B4-BE49-F238E27FC236}">
-                <a16:creationId xmlns:a16="http://schemas.microsoft.com/office/drawing/2014/main" xmlns="" id="{1C003777-5A5E-C7E2-893A-996B87B18C40}"/>
+                <a16:creationId xmlns:a16="http://schemas.microsoft.com/office/drawing/2014/main" id="{1C003777-5A5E-C7E2-893A-996B87B18C40}"/>
               </a:ext>
             </a:extLst>
           </p:cNvPr>
@@ -17470,7 +17442,7 @@
           <p:cNvPr id="10" name="Picture 9">
             <a:extLst>
               <a:ext uri="{FF2B5EF4-FFF2-40B4-BE49-F238E27FC236}">
-                <a16:creationId xmlns:a16="http://schemas.microsoft.com/office/drawing/2014/main" xmlns="" id="{4F3FCFB8-B05B-9807-D53D-0030FFA1A9C5}"/>
+                <a16:creationId xmlns:a16="http://schemas.microsoft.com/office/drawing/2014/main" id="{4F3FCFB8-B05B-9807-D53D-0030FFA1A9C5}"/>
               </a:ext>
             </a:extLst>
           </p:cNvPr>
@@ -17505,13 +17477,6 @@
   <p:clrMapOvr>
     <a:masterClrMapping/>
   </p:clrMapOvr>
-  <p:timing>
-    <p:tnLst>
-      <p:par>
-        <p:cTn id="1" dur="indefinite" restart="never" nodeType="tmRoot"/>
-      </p:par>
-    </p:tnLst>
-  </p:timing>
 </p:sld>
 </file>
 
@@ -17537,7 +17502,7 @@
           <p:cNvPr id="2" name="Title 1">
             <a:extLst>
               <a:ext uri="{FF2B5EF4-FFF2-40B4-BE49-F238E27FC236}">
-                <a16:creationId xmlns:a16="http://schemas.microsoft.com/office/drawing/2014/main" xmlns="" id="{9182B811-727A-79E2-BB7B-B5CF84A77D10}"/>
+                <a16:creationId xmlns:a16="http://schemas.microsoft.com/office/drawing/2014/main" id="{9182B811-727A-79E2-BB7B-B5CF84A77D10}"/>
               </a:ext>
             </a:extLst>
           </p:cNvPr>
@@ -17577,7 +17542,7 @@
           <p:cNvPr id="3" name="Group 2">
             <a:extLst>
               <a:ext uri="{FF2B5EF4-FFF2-40B4-BE49-F238E27FC236}">
-                <a16:creationId xmlns:a16="http://schemas.microsoft.com/office/drawing/2014/main" xmlns="" id="{9EBBF7C4-B243-9A8A-9239-9FE92A6B65FA}"/>
+                <a16:creationId xmlns:a16="http://schemas.microsoft.com/office/drawing/2014/main" id="{9EBBF7C4-B243-9A8A-9239-9FE92A6B65FA}"/>
               </a:ext>
             </a:extLst>
           </p:cNvPr>
@@ -17597,7 +17562,7 @@
             <p:cNvPr id="7" name="Rectangle: Rounded Corners 6">
               <a:extLst>
                 <a:ext uri="{FF2B5EF4-FFF2-40B4-BE49-F238E27FC236}">
-                  <a16:creationId xmlns:a16="http://schemas.microsoft.com/office/drawing/2014/main" xmlns="" id="{C3DA1470-C9E8-A2BD-23BA-E4BE409EED3F}"/>
+                  <a16:creationId xmlns:a16="http://schemas.microsoft.com/office/drawing/2014/main" id="{C3DA1470-C9E8-A2BD-23BA-E4BE409EED3F}"/>
                 </a:ext>
               </a:extLst>
             </p:cNvPr>
@@ -17656,7 +17621,7 @@
             <p:cNvPr id="8" name="Rectangle: Rounded Corners 7">
               <a:extLst>
                 <a:ext uri="{FF2B5EF4-FFF2-40B4-BE49-F238E27FC236}">
-                  <a16:creationId xmlns:a16="http://schemas.microsoft.com/office/drawing/2014/main" xmlns="" id="{C90EEC44-C5C0-5159-8D59-84343F82215F}"/>
+                  <a16:creationId xmlns:a16="http://schemas.microsoft.com/office/drawing/2014/main" id="{C90EEC44-C5C0-5159-8D59-84343F82215F}"/>
                 </a:ext>
               </a:extLst>
             </p:cNvPr>
@@ -17715,7 +17680,7 @@
             <p:cNvPr id="21" name="TextBox 20">
               <a:extLst>
                 <a:ext uri="{FF2B5EF4-FFF2-40B4-BE49-F238E27FC236}">
-                  <a16:creationId xmlns:a16="http://schemas.microsoft.com/office/drawing/2014/main" xmlns="" id="{B8E51749-DB5D-80FF-2B5C-6901897A1F92}"/>
+                  <a16:creationId xmlns:a16="http://schemas.microsoft.com/office/drawing/2014/main" id="{B8E51749-DB5D-80FF-2B5C-6901897A1F92}"/>
                 </a:ext>
               </a:extLst>
             </p:cNvPr>
@@ -17753,7 +17718,7 @@
             <p:cNvPr id="47" name="Rectangle: Rounded Corners 46">
               <a:extLst>
                 <a:ext uri="{FF2B5EF4-FFF2-40B4-BE49-F238E27FC236}">
-                  <a16:creationId xmlns:a16="http://schemas.microsoft.com/office/drawing/2014/main" xmlns="" id="{A0704E4A-D76C-0030-4113-D9478C8534F2}"/>
+                  <a16:creationId xmlns:a16="http://schemas.microsoft.com/office/drawing/2014/main" id="{A0704E4A-D76C-0030-4113-D9478C8534F2}"/>
                 </a:ext>
               </a:extLst>
             </p:cNvPr>
@@ -17812,7 +17777,7 @@
             <p:cNvPr id="52" name="Connector: Elbow 51">
               <a:extLst>
                 <a:ext uri="{FF2B5EF4-FFF2-40B4-BE49-F238E27FC236}">
-                  <a16:creationId xmlns:a16="http://schemas.microsoft.com/office/drawing/2014/main" xmlns="" id="{9D624814-DB70-A9E4-0D7F-D90662E27A7C}"/>
+                  <a16:creationId xmlns:a16="http://schemas.microsoft.com/office/drawing/2014/main" id="{9D624814-DB70-A9E4-0D7F-D90662E27A7C}"/>
                 </a:ext>
               </a:extLst>
             </p:cNvPr>
@@ -17857,7 +17822,7 @@
             <p:cNvPr id="54" name="Connector: Elbow 53">
               <a:extLst>
                 <a:ext uri="{FF2B5EF4-FFF2-40B4-BE49-F238E27FC236}">
-                  <a16:creationId xmlns:a16="http://schemas.microsoft.com/office/drawing/2014/main" xmlns="" id="{C5EE6F16-DD93-EFAA-5580-CE1F58572F10}"/>
+                  <a16:creationId xmlns:a16="http://schemas.microsoft.com/office/drawing/2014/main" id="{C5EE6F16-DD93-EFAA-5580-CE1F58572F10}"/>
                 </a:ext>
               </a:extLst>
             </p:cNvPr>
@@ -17902,7 +17867,7 @@
             <p:cNvPr id="58" name="Connector: Elbow 57">
               <a:extLst>
                 <a:ext uri="{FF2B5EF4-FFF2-40B4-BE49-F238E27FC236}">
-                  <a16:creationId xmlns:a16="http://schemas.microsoft.com/office/drawing/2014/main" xmlns="" id="{8D8B8F00-6295-37A3-0326-1CF269ECA7CC}"/>
+                  <a16:creationId xmlns:a16="http://schemas.microsoft.com/office/drawing/2014/main" id="{8D8B8F00-6295-37A3-0326-1CF269ECA7CC}"/>
                 </a:ext>
               </a:extLst>
             </p:cNvPr>
@@ -17946,7 +17911,7 @@
             <p:cNvPr id="60" name="Connector: Elbow 59">
               <a:extLst>
                 <a:ext uri="{FF2B5EF4-FFF2-40B4-BE49-F238E27FC236}">
-                  <a16:creationId xmlns:a16="http://schemas.microsoft.com/office/drawing/2014/main" xmlns="" id="{00A4B8E6-FE36-86A4-C5FF-57BE7F0C8577}"/>
+                  <a16:creationId xmlns:a16="http://schemas.microsoft.com/office/drawing/2014/main" id="{00A4B8E6-FE36-86A4-C5FF-57BE7F0C8577}"/>
                 </a:ext>
               </a:extLst>
             </p:cNvPr>
@@ -17990,7 +17955,7 @@
             <p:cNvPr id="67" name="Rectangle: Rounded Corners 66">
               <a:extLst>
                 <a:ext uri="{FF2B5EF4-FFF2-40B4-BE49-F238E27FC236}">
-                  <a16:creationId xmlns:a16="http://schemas.microsoft.com/office/drawing/2014/main" xmlns="" id="{462BBB33-17CD-37AA-4F81-B5403D0C6466}"/>
+                  <a16:creationId xmlns:a16="http://schemas.microsoft.com/office/drawing/2014/main" id="{462BBB33-17CD-37AA-4F81-B5403D0C6466}"/>
                 </a:ext>
               </a:extLst>
             </p:cNvPr>
@@ -18066,7 +18031,7 @@
             <p:cNvPr id="68" name="Connector: Elbow 67">
               <a:extLst>
                 <a:ext uri="{FF2B5EF4-FFF2-40B4-BE49-F238E27FC236}">
-                  <a16:creationId xmlns:a16="http://schemas.microsoft.com/office/drawing/2014/main" xmlns="" id="{ECBB05CB-0E86-F46E-0128-3C1E69790801}"/>
+                  <a16:creationId xmlns:a16="http://schemas.microsoft.com/office/drawing/2014/main" id="{ECBB05CB-0E86-F46E-0128-3C1E69790801}"/>
                 </a:ext>
               </a:extLst>
             </p:cNvPr>
@@ -18110,7 +18075,7 @@
             <p:cNvPr id="70" name="Connector: Elbow 69">
               <a:extLst>
                 <a:ext uri="{FF2B5EF4-FFF2-40B4-BE49-F238E27FC236}">
-                  <a16:creationId xmlns:a16="http://schemas.microsoft.com/office/drawing/2014/main" xmlns="" id="{ABF153F2-B194-27C8-BFE7-EF727D74842B}"/>
+                  <a16:creationId xmlns:a16="http://schemas.microsoft.com/office/drawing/2014/main" id="{ABF153F2-B194-27C8-BFE7-EF727D74842B}"/>
                 </a:ext>
               </a:extLst>
             </p:cNvPr>
@@ -18154,7 +18119,7 @@
             <p:cNvPr id="71" name="Rectangle: Rounded Corners 70">
               <a:extLst>
                 <a:ext uri="{FF2B5EF4-FFF2-40B4-BE49-F238E27FC236}">
-                  <a16:creationId xmlns:a16="http://schemas.microsoft.com/office/drawing/2014/main" xmlns="" id="{5BCAC113-F032-2744-3086-4F1F42B0FD2A}"/>
+                  <a16:creationId xmlns:a16="http://schemas.microsoft.com/office/drawing/2014/main" id="{5BCAC113-F032-2744-3086-4F1F42B0FD2A}"/>
                 </a:ext>
               </a:extLst>
             </p:cNvPr>
@@ -18230,7 +18195,7 @@
             <p:cNvPr id="76" name="TextBox 75">
               <a:extLst>
                 <a:ext uri="{FF2B5EF4-FFF2-40B4-BE49-F238E27FC236}">
-                  <a16:creationId xmlns:a16="http://schemas.microsoft.com/office/drawing/2014/main" xmlns="" id="{86BED026-FA9D-14A9-5DF9-6A732F71BD1E}"/>
+                  <a16:creationId xmlns:a16="http://schemas.microsoft.com/office/drawing/2014/main" id="{86BED026-FA9D-14A9-5DF9-6A732F71BD1E}"/>
                 </a:ext>
               </a:extLst>
             </p:cNvPr>
@@ -18268,7 +18233,7 @@
             <p:cNvPr id="77" name="Connector: Elbow 76">
               <a:extLst>
                 <a:ext uri="{FF2B5EF4-FFF2-40B4-BE49-F238E27FC236}">
-                  <a16:creationId xmlns:a16="http://schemas.microsoft.com/office/drawing/2014/main" xmlns="" id="{F4E9F2DB-C291-06F0-599C-D053E3D1BF92}"/>
+                  <a16:creationId xmlns:a16="http://schemas.microsoft.com/office/drawing/2014/main" id="{F4E9F2DB-C291-06F0-599C-D053E3D1BF92}"/>
                 </a:ext>
               </a:extLst>
             </p:cNvPr>
@@ -18313,7 +18278,7 @@
             <p:cNvPr id="78" name="Connector: Elbow 77">
               <a:extLst>
                 <a:ext uri="{FF2B5EF4-FFF2-40B4-BE49-F238E27FC236}">
-                  <a16:creationId xmlns:a16="http://schemas.microsoft.com/office/drawing/2014/main" xmlns="" id="{CC948B2B-6EBB-8AC9-E355-182431F7565C}"/>
+                  <a16:creationId xmlns:a16="http://schemas.microsoft.com/office/drawing/2014/main" id="{CC948B2B-6EBB-8AC9-E355-182431F7565C}"/>
                 </a:ext>
               </a:extLst>
             </p:cNvPr>
@@ -18358,7 +18323,7 @@
             <p:cNvPr id="79" name="Rectangle: Rounded Corners 78">
               <a:extLst>
                 <a:ext uri="{FF2B5EF4-FFF2-40B4-BE49-F238E27FC236}">
-                  <a16:creationId xmlns:a16="http://schemas.microsoft.com/office/drawing/2014/main" xmlns="" id="{9F8AD74F-13DF-0AFB-6B82-1886DE4B7487}"/>
+                  <a16:creationId xmlns:a16="http://schemas.microsoft.com/office/drawing/2014/main" id="{9F8AD74F-13DF-0AFB-6B82-1886DE4B7487}"/>
                 </a:ext>
               </a:extLst>
             </p:cNvPr>
@@ -18437,7 +18402,7 @@
             <p:cNvPr id="111" name="Rectangle: Rounded Corners 110">
               <a:extLst>
                 <a:ext uri="{FF2B5EF4-FFF2-40B4-BE49-F238E27FC236}">
-                  <a16:creationId xmlns:a16="http://schemas.microsoft.com/office/drawing/2014/main" xmlns="" id="{F11CB255-FAC2-4BBB-1CCA-A30453E8FBF3}"/>
+                  <a16:creationId xmlns:a16="http://schemas.microsoft.com/office/drawing/2014/main" id="{F11CB255-FAC2-4BBB-1CCA-A30453E8FBF3}"/>
                 </a:ext>
               </a:extLst>
             </p:cNvPr>
@@ -18506,7 +18471,7 @@
             <p:cNvPr id="113" name="Straight Connector 112">
               <a:extLst>
                 <a:ext uri="{FF2B5EF4-FFF2-40B4-BE49-F238E27FC236}">
-                  <a16:creationId xmlns:a16="http://schemas.microsoft.com/office/drawing/2014/main" xmlns="" id="{1FD187ED-F586-0AC4-9D15-48C59443422F}"/>
+                  <a16:creationId xmlns:a16="http://schemas.microsoft.com/office/drawing/2014/main" id="{1FD187ED-F586-0AC4-9D15-48C59443422F}"/>
                 </a:ext>
               </a:extLst>
             </p:cNvPr>
@@ -18550,7 +18515,7 @@
             <p:cNvPr id="117" name="Connector: Elbow 116">
               <a:extLst>
                 <a:ext uri="{FF2B5EF4-FFF2-40B4-BE49-F238E27FC236}">
-                  <a16:creationId xmlns:a16="http://schemas.microsoft.com/office/drawing/2014/main" xmlns="" id="{ADCD9BC5-838D-5609-6BD1-197A6DD5493A}"/>
+                  <a16:creationId xmlns:a16="http://schemas.microsoft.com/office/drawing/2014/main" id="{ADCD9BC5-838D-5609-6BD1-197A6DD5493A}"/>
                 </a:ext>
               </a:extLst>
             </p:cNvPr>
@@ -18593,7 +18558,7 @@
             <p:cNvPr id="119" name="Connector: Elbow 118">
               <a:extLst>
                 <a:ext uri="{FF2B5EF4-FFF2-40B4-BE49-F238E27FC236}">
-                  <a16:creationId xmlns:a16="http://schemas.microsoft.com/office/drawing/2014/main" xmlns="" id="{10ACFC60-76C2-C883-28B6-69578DD2A885}"/>
+                  <a16:creationId xmlns:a16="http://schemas.microsoft.com/office/drawing/2014/main" id="{10ACFC60-76C2-C883-28B6-69578DD2A885}"/>
                 </a:ext>
               </a:extLst>
             </p:cNvPr>
@@ -18637,7 +18602,7 @@
             <p:cNvPr id="120" name="TextBox 119">
               <a:extLst>
                 <a:ext uri="{FF2B5EF4-FFF2-40B4-BE49-F238E27FC236}">
-                  <a16:creationId xmlns:a16="http://schemas.microsoft.com/office/drawing/2014/main" xmlns="" id="{9B148E5F-A1E2-C34B-8A7F-1B0917DA7ED2}"/>
+                  <a16:creationId xmlns:a16="http://schemas.microsoft.com/office/drawing/2014/main" id="{9B148E5F-A1E2-C34B-8A7F-1B0917DA7ED2}"/>
                 </a:ext>
               </a:extLst>
             </p:cNvPr>
@@ -18681,13 +18646,6 @@
   <p:clrMapOvr>
     <a:masterClrMapping/>
   </p:clrMapOvr>
-  <p:timing>
-    <p:tnLst>
-      <p:par>
-        <p:cTn id="1" dur="indefinite" restart="never" nodeType="tmRoot"/>
-      </p:par>
-    </p:tnLst>
-  </p:timing>
 </p:sld>
 </file>
 
@@ -18713,7 +18671,7 @@
           <p:cNvPr id="2" name="Title 1">
             <a:extLst>
               <a:ext uri="{FF2B5EF4-FFF2-40B4-BE49-F238E27FC236}">
-                <a16:creationId xmlns:a16="http://schemas.microsoft.com/office/drawing/2014/main" xmlns="" id="{826E4E61-93D0-4561-E540-E7D3E698A051}"/>
+                <a16:creationId xmlns:a16="http://schemas.microsoft.com/office/drawing/2014/main" id="{826E4E61-93D0-4561-E540-E7D3E698A051}"/>
               </a:ext>
             </a:extLst>
           </p:cNvPr>
@@ -18748,7 +18706,7 @@
           <p:cNvPr id="4" name="TextBox 3">
             <a:extLst>
               <a:ext uri="{FF2B5EF4-FFF2-40B4-BE49-F238E27FC236}">
-                <a16:creationId xmlns:a16="http://schemas.microsoft.com/office/drawing/2014/main" xmlns="" id="{A3CD43EE-9E0D-C87D-A567-729B4A4CA739}"/>
+                <a16:creationId xmlns:a16="http://schemas.microsoft.com/office/drawing/2014/main" id="{A3CD43EE-9E0D-C87D-A567-729B4A4CA739}"/>
               </a:ext>
             </a:extLst>
           </p:cNvPr>
@@ -18827,7 +18785,7 @@
           <p:cNvPr id="5" name="Table 4">
             <a:extLst>
               <a:ext uri="{FF2B5EF4-FFF2-40B4-BE49-F238E27FC236}">
-                <a16:creationId xmlns:a16="http://schemas.microsoft.com/office/drawing/2014/main" xmlns="" id="{9934400E-CCB9-5308-7A9A-161BF89144F8}"/>
+                <a16:creationId xmlns:a16="http://schemas.microsoft.com/office/drawing/2014/main" id="{9934400E-CCB9-5308-7A9A-161BF89144F8}"/>
               </a:ext>
             </a:extLst>
           </p:cNvPr>
@@ -18856,49 +18814,49 @@
                 <a:gridCol w="1621643">
                   <a:extLst>
                     <a:ext uri="{9D8B030D-6E8A-4147-A177-3AD203B41FA5}">
-                      <a16:colId xmlns:a16="http://schemas.microsoft.com/office/drawing/2014/main" xmlns="" val="3041726463"/>
+                      <a16:colId xmlns:a16="http://schemas.microsoft.com/office/drawing/2014/main" val="3041726463"/>
                     </a:ext>
                   </a:extLst>
                 </a:gridCol>
                 <a:gridCol w="1114346">
                   <a:extLst>
                     <a:ext uri="{9D8B030D-6E8A-4147-A177-3AD203B41FA5}">
-                      <a16:colId xmlns:a16="http://schemas.microsoft.com/office/drawing/2014/main" xmlns="" val="2437366668"/>
+                      <a16:colId xmlns:a16="http://schemas.microsoft.com/office/drawing/2014/main" val="2437366668"/>
                     </a:ext>
                   </a:extLst>
                 </a:gridCol>
                 <a:gridCol w="1114346">
                   <a:extLst>
                     <a:ext uri="{9D8B030D-6E8A-4147-A177-3AD203B41FA5}">
-                      <a16:colId xmlns:a16="http://schemas.microsoft.com/office/drawing/2014/main" xmlns="" val="531118449"/>
+                      <a16:colId xmlns:a16="http://schemas.microsoft.com/office/drawing/2014/main" val="531118449"/>
                     </a:ext>
                   </a:extLst>
                 </a:gridCol>
                 <a:gridCol w="1114346">
                   <a:extLst>
                     <a:ext uri="{9D8B030D-6E8A-4147-A177-3AD203B41FA5}">
-                      <a16:colId xmlns:a16="http://schemas.microsoft.com/office/drawing/2014/main" xmlns="" val="2564084159"/>
+                      <a16:colId xmlns:a16="http://schemas.microsoft.com/office/drawing/2014/main" val="2564084159"/>
                     </a:ext>
                   </a:extLst>
                 </a:gridCol>
                 <a:gridCol w="1114346">
                   <a:extLst>
                     <a:ext uri="{9D8B030D-6E8A-4147-A177-3AD203B41FA5}">
-                      <a16:colId xmlns:a16="http://schemas.microsoft.com/office/drawing/2014/main" xmlns="" val="2779029642"/>
+                      <a16:colId xmlns:a16="http://schemas.microsoft.com/office/drawing/2014/main" val="2779029642"/>
                     </a:ext>
                   </a:extLst>
                 </a:gridCol>
                 <a:gridCol w="1114346">
                   <a:extLst>
                     <a:ext uri="{9D8B030D-6E8A-4147-A177-3AD203B41FA5}">
-                      <a16:colId xmlns:a16="http://schemas.microsoft.com/office/drawing/2014/main" xmlns="" val="3129705701"/>
+                      <a16:colId xmlns:a16="http://schemas.microsoft.com/office/drawing/2014/main" val="3129705701"/>
                     </a:ext>
                   </a:extLst>
                 </a:gridCol>
                 <a:gridCol w="1114346">
                   <a:extLst>
                     <a:ext uri="{9D8B030D-6E8A-4147-A177-3AD203B41FA5}">
-                      <a16:colId xmlns:a16="http://schemas.microsoft.com/office/drawing/2014/main" xmlns="" val="3319955156"/>
+                      <a16:colId xmlns:a16="http://schemas.microsoft.com/office/drawing/2014/main" val="3319955156"/>
                     </a:ext>
                   </a:extLst>
                 </a:gridCol>
@@ -19221,7 +19179,7 @@
                 </a:tc>
                 <a:extLst>
                   <a:ext uri="{0D108BD9-81ED-4DB2-BD59-A6C34878D82A}">
-                    <a16:rowId xmlns:a16="http://schemas.microsoft.com/office/drawing/2014/main" xmlns="" val="419171914"/>
+                    <a16:rowId xmlns:a16="http://schemas.microsoft.com/office/drawing/2014/main" val="419171914"/>
                   </a:ext>
                 </a:extLst>
               </a:tr>
@@ -19606,7 +19564,7 @@
                 </a:tc>
                 <a:extLst>
                   <a:ext uri="{0D108BD9-81ED-4DB2-BD59-A6C34878D82A}">
-                    <a16:rowId xmlns:a16="http://schemas.microsoft.com/office/drawing/2014/main" xmlns="" val="1434253989"/>
+                    <a16:rowId xmlns:a16="http://schemas.microsoft.com/office/drawing/2014/main" val="1434253989"/>
                   </a:ext>
                 </a:extLst>
               </a:tr>
@@ -19980,7 +19938,7 @@
                 </a:tc>
                 <a:extLst>
                   <a:ext uri="{0D108BD9-81ED-4DB2-BD59-A6C34878D82A}">
-                    <a16:rowId xmlns:a16="http://schemas.microsoft.com/office/drawing/2014/main" xmlns="" val="1123582624"/>
+                    <a16:rowId xmlns:a16="http://schemas.microsoft.com/office/drawing/2014/main" val="1123582624"/>
                   </a:ext>
                 </a:extLst>
               </a:tr>
@@ -20347,7 +20305,7 @@
                 </a:tc>
                 <a:extLst>
                   <a:ext uri="{0D108BD9-81ED-4DB2-BD59-A6C34878D82A}">
-                    <a16:rowId xmlns:a16="http://schemas.microsoft.com/office/drawing/2014/main" xmlns="" val="1194998983"/>
+                    <a16:rowId xmlns:a16="http://schemas.microsoft.com/office/drawing/2014/main" val="1194998983"/>
                   </a:ext>
                 </a:extLst>
               </a:tr>
@@ -20658,7 +20616,7 @@
                 </a:tc>
                 <a:extLst>
                   <a:ext uri="{0D108BD9-81ED-4DB2-BD59-A6C34878D82A}">
-                    <a16:rowId xmlns:a16="http://schemas.microsoft.com/office/drawing/2014/main" xmlns="" val="3886053095"/>
+                    <a16:rowId xmlns:a16="http://schemas.microsoft.com/office/drawing/2014/main" val="3886053095"/>
                   </a:ext>
                 </a:extLst>
               </a:tr>
@@ -20701,7 +20659,7 @@
           <p:cNvPr id="2" name="Title 1">
             <a:extLst>
               <a:ext uri="{FF2B5EF4-FFF2-40B4-BE49-F238E27FC236}">
-                <a16:creationId xmlns:a16="http://schemas.microsoft.com/office/drawing/2014/main" xmlns="" id="{826E4E61-93D0-4561-E540-E7D3E698A051}"/>
+                <a16:creationId xmlns:a16="http://schemas.microsoft.com/office/drawing/2014/main" id="{826E4E61-93D0-4561-E540-E7D3E698A051}"/>
               </a:ext>
             </a:extLst>
           </p:cNvPr>
@@ -20736,7 +20694,7 @@
           <p:cNvPr id="4" name="TextBox 3">
             <a:extLst>
               <a:ext uri="{FF2B5EF4-FFF2-40B4-BE49-F238E27FC236}">
-                <a16:creationId xmlns:a16="http://schemas.microsoft.com/office/drawing/2014/main" xmlns="" id="{A3CD43EE-9E0D-C87D-A567-729B4A4CA739}"/>
+                <a16:creationId xmlns:a16="http://schemas.microsoft.com/office/drawing/2014/main" id="{A3CD43EE-9E0D-C87D-A567-729B4A4CA739}"/>
               </a:ext>
             </a:extLst>
           </p:cNvPr>
@@ -20815,7 +20773,7 @@
           <p:cNvPr id="5" name="Table 4">
             <a:extLst>
               <a:ext uri="{FF2B5EF4-FFF2-40B4-BE49-F238E27FC236}">
-                <a16:creationId xmlns:a16="http://schemas.microsoft.com/office/drawing/2014/main" xmlns="" id="{9934400E-CCB9-5308-7A9A-161BF89144F8}"/>
+                <a16:creationId xmlns:a16="http://schemas.microsoft.com/office/drawing/2014/main" id="{9934400E-CCB9-5308-7A9A-161BF89144F8}"/>
               </a:ext>
             </a:extLst>
           </p:cNvPr>
@@ -20844,49 +20802,49 @@
                 <a:gridCol w="1621643">
                   <a:extLst>
                     <a:ext uri="{9D8B030D-6E8A-4147-A177-3AD203B41FA5}">
-                      <a16:colId xmlns:a16="http://schemas.microsoft.com/office/drawing/2014/main" xmlns="" val="3041726463"/>
+                      <a16:colId xmlns:a16="http://schemas.microsoft.com/office/drawing/2014/main" val="3041726463"/>
                     </a:ext>
                   </a:extLst>
                 </a:gridCol>
                 <a:gridCol w="1114346">
                   <a:extLst>
                     <a:ext uri="{9D8B030D-6E8A-4147-A177-3AD203B41FA5}">
-                      <a16:colId xmlns:a16="http://schemas.microsoft.com/office/drawing/2014/main" xmlns="" val="2437366668"/>
+                      <a16:colId xmlns:a16="http://schemas.microsoft.com/office/drawing/2014/main" val="2437366668"/>
                     </a:ext>
                   </a:extLst>
                 </a:gridCol>
                 <a:gridCol w="1114346">
                   <a:extLst>
                     <a:ext uri="{9D8B030D-6E8A-4147-A177-3AD203B41FA5}">
-                      <a16:colId xmlns:a16="http://schemas.microsoft.com/office/drawing/2014/main" xmlns="" val="531118449"/>
+                      <a16:colId xmlns:a16="http://schemas.microsoft.com/office/drawing/2014/main" val="531118449"/>
                     </a:ext>
                   </a:extLst>
                 </a:gridCol>
                 <a:gridCol w="1114346">
                   <a:extLst>
                     <a:ext uri="{9D8B030D-6E8A-4147-A177-3AD203B41FA5}">
-                      <a16:colId xmlns:a16="http://schemas.microsoft.com/office/drawing/2014/main" xmlns="" val="2564084159"/>
+                      <a16:colId xmlns:a16="http://schemas.microsoft.com/office/drawing/2014/main" val="2564084159"/>
                     </a:ext>
                   </a:extLst>
                 </a:gridCol>
                 <a:gridCol w="1114346">
                   <a:extLst>
                     <a:ext uri="{9D8B030D-6E8A-4147-A177-3AD203B41FA5}">
-                      <a16:colId xmlns:a16="http://schemas.microsoft.com/office/drawing/2014/main" xmlns="" val="2779029642"/>
+                      <a16:colId xmlns:a16="http://schemas.microsoft.com/office/drawing/2014/main" val="2779029642"/>
                     </a:ext>
                   </a:extLst>
                 </a:gridCol>
                 <a:gridCol w="1114346">
                   <a:extLst>
                     <a:ext uri="{9D8B030D-6E8A-4147-A177-3AD203B41FA5}">
-                      <a16:colId xmlns:a16="http://schemas.microsoft.com/office/drawing/2014/main" xmlns="" val="3129705701"/>
+                      <a16:colId xmlns:a16="http://schemas.microsoft.com/office/drawing/2014/main" val="3129705701"/>
                     </a:ext>
                   </a:extLst>
                 </a:gridCol>
                 <a:gridCol w="1114346">
                   <a:extLst>
                     <a:ext uri="{9D8B030D-6E8A-4147-A177-3AD203B41FA5}">
-                      <a16:colId xmlns:a16="http://schemas.microsoft.com/office/drawing/2014/main" xmlns="" val="3319955156"/>
+                      <a16:colId xmlns:a16="http://schemas.microsoft.com/office/drawing/2014/main" val="3319955156"/>
                     </a:ext>
                   </a:extLst>
                 </a:gridCol>
@@ -21209,7 +21167,7 @@
                 </a:tc>
                 <a:extLst>
                   <a:ext uri="{0D108BD9-81ED-4DB2-BD59-A6C34878D82A}">
-                    <a16:rowId xmlns:a16="http://schemas.microsoft.com/office/drawing/2014/main" xmlns="" val="419171914"/>
+                    <a16:rowId xmlns:a16="http://schemas.microsoft.com/office/drawing/2014/main" val="419171914"/>
                   </a:ext>
                 </a:extLst>
               </a:tr>
@@ -21594,7 +21552,7 @@
                 </a:tc>
                 <a:extLst>
                   <a:ext uri="{0D108BD9-81ED-4DB2-BD59-A6C34878D82A}">
-                    <a16:rowId xmlns:a16="http://schemas.microsoft.com/office/drawing/2014/main" xmlns="" val="1434253989"/>
+                    <a16:rowId xmlns:a16="http://schemas.microsoft.com/office/drawing/2014/main" val="1434253989"/>
                   </a:ext>
                 </a:extLst>
               </a:tr>
@@ -21971,7 +21929,7 @@
                 </a:tc>
                 <a:extLst>
                   <a:ext uri="{0D108BD9-81ED-4DB2-BD59-A6C34878D82A}">
-                    <a16:rowId xmlns:a16="http://schemas.microsoft.com/office/drawing/2014/main" xmlns="" val="1123582624"/>
+                    <a16:rowId xmlns:a16="http://schemas.microsoft.com/office/drawing/2014/main" val="1123582624"/>
                   </a:ext>
                 </a:extLst>
               </a:tr>
@@ -22341,7 +22299,7 @@
                 </a:tc>
                 <a:extLst>
                   <a:ext uri="{0D108BD9-81ED-4DB2-BD59-A6C34878D82A}">
-                    <a16:rowId xmlns:a16="http://schemas.microsoft.com/office/drawing/2014/main" xmlns="" val="1194998983"/>
+                    <a16:rowId xmlns:a16="http://schemas.microsoft.com/office/drawing/2014/main" val="1194998983"/>
                   </a:ext>
                 </a:extLst>
               </a:tr>
@@ -22655,7 +22613,7 @@
                 </a:tc>
                 <a:extLst>
                   <a:ext uri="{0D108BD9-81ED-4DB2-BD59-A6C34878D82A}">
-                    <a16:rowId xmlns:a16="http://schemas.microsoft.com/office/drawing/2014/main" xmlns="" val="3886053095"/>
+                    <a16:rowId xmlns:a16="http://schemas.microsoft.com/office/drawing/2014/main" val="3886053095"/>
                   </a:ext>
                 </a:extLst>
               </a:tr>
@@ -22698,7 +22656,7 @@
           <p:cNvPr id="2" name="Title 1">
             <a:extLst>
               <a:ext uri="{FF2B5EF4-FFF2-40B4-BE49-F238E27FC236}">
-                <a16:creationId xmlns:a16="http://schemas.microsoft.com/office/drawing/2014/main" xmlns="" id="{826E4E61-93D0-4561-E540-E7D3E698A051}"/>
+                <a16:creationId xmlns:a16="http://schemas.microsoft.com/office/drawing/2014/main" id="{826E4E61-93D0-4561-E540-E7D3E698A051}"/>
               </a:ext>
             </a:extLst>
           </p:cNvPr>
@@ -22733,7 +22691,7 @@
           <p:cNvPr id="4" name="TextBox 3">
             <a:extLst>
               <a:ext uri="{FF2B5EF4-FFF2-40B4-BE49-F238E27FC236}">
-                <a16:creationId xmlns:a16="http://schemas.microsoft.com/office/drawing/2014/main" xmlns="" id="{A3CD43EE-9E0D-C87D-A567-729B4A4CA739}"/>
+                <a16:creationId xmlns:a16="http://schemas.microsoft.com/office/drawing/2014/main" id="{A3CD43EE-9E0D-C87D-A567-729B4A4CA739}"/>
               </a:ext>
             </a:extLst>
           </p:cNvPr>
@@ -22812,7 +22770,7 @@
           <p:cNvPr id="5" name="Table 4">
             <a:extLst>
               <a:ext uri="{FF2B5EF4-FFF2-40B4-BE49-F238E27FC236}">
-                <a16:creationId xmlns:a16="http://schemas.microsoft.com/office/drawing/2014/main" xmlns="" id="{9934400E-CCB9-5308-7A9A-161BF89144F8}"/>
+                <a16:creationId xmlns:a16="http://schemas.microsoft.com/office/drawing/2014/main" id="{9934400E-CCB9-5308-7A9A-161BF89144F8}"/>
               </a:ext>
             </a:extLst>
           </p:cNvPr>
@@ -22841,49 +22799,49 @@
                 <a:gridCol w="1621643">
                   <a:extLst>
                     <a:ext uri="{9D8B030D-6E8A-4147-A177-3AD203B41FA5}">
-                      <a16:colId xmlns:a16="http://schemas.microsoft.com/office/drawing/2014/main" xmlns="" val="3041726463"/>
+                      <a16:colId xmlns:a16="http://schemas.microsoft.com/office/drawing/2014/main" val="3041726463"/>
                     </a:ext>
                   </a:extLst>
                 </a:gridCol>
                 <a:gridCol w="1114346">
                   <a:extLst>
                     <a:ext uri="{9D8B030D-6E8A-4147-A177-3AD203B41FA5}">
-                      <a16:colId xmlns:a16="http://schemas.microsoft.com/office/drawing/2014/main" xmlns="" val="2437366668"/>
+                      <a16:colId xmlns:a16="http://schemas.microsoft.com/office/drawing/2014/main" val="2437366668"/>
                     </a:ext>
                   </a:extLst>
                 </a:gridCol>
                 <a:gridCol w="1114346">
                   <a:extLst>
                     <a:ext uri="{9D8B030D-6E8A-4147-A177-3AD203B41FA5}">
-                      <a16:colId xmlns:a16="http://schemas.microsoft.com/office/drawing/2014/main" xmlns="" val="531118449"/>
+                      <a16:colId xmlns:a16="http://schemas.microsoft.com/office/drawing/2014/main" val="531118449"/>
                     </a:ext>
                   </a:extLst>
                 </a:gridCol>
                 <a:gridCol w="1114346">
                   <a:extLst>
                     <a:ext uri="{9D8B030D-6E8A-4147-A177-3AD203B41FA5}">
-                      <a16:colId xmlns:a16="http://schemas.microsoft.com/office/drawing/2014/main" xmlns="" val="2564084159"/>
+                      <a16:colId xmlns:a16="http://schemas.microsoft.com/office/drawing/2014/main" val="2564084159"/>
                     </a:ext>
                   </a:extLst>
                 </a:gridCol>
                 <a:gridCol w="1114346">
                   <a:extLst>
                     <a:ext uri="{9D8B030D-6E8A-4147-A177-3AD203B41FA5}">
-                      <a16:colId xmlns:a16="http://schemas.microsoft.com/office/drawing/2014/main" xmlns="" val="2779029642"/>
+                      <a16:colId xmlns:a16="http://schemas.microsoft.com/office/drawing/2014/main" val="2779029642"/>
                     </a:ext>
                   </a:extLst>
                 </a:gridCol>
                 <a:gridCol w="1114346">
                   <a:extLst>
                     <a:ext uri="{9D8B030D-6E8A-4147-A177-3AD203B41FA5}">
-                      <a16:colId xmlns:a16="http://schemas.microsoft.com/office/drawing/2014/main" xmlns="" val="3129705701"/>
+                      <a16:colId xmlns:a16="http://schemas.microsoft.com/office/drawing/2014/main" val="3129705701"/>
                     </a:ext>
                   </a:extLst>
                 </a:gridCol>
                 <a:gridCol w="1114346">
                   <a:extLst>
                     <a:ext uri="{9D8B030D-6E8A-4147-A177-3AD203B41FA5}">
-                      <a16:colId xmlns:a16="http://schemas.microsoft.com/office/drawing/2014/main" xmlns="" val="3319955156"/>
+                      <a16:colId xmlns:a16="http://schemas.microsoft.com/office/drawing/2014/main" val="3319955156"/>
                     </a:ext>
                   </a:extLst>
                 </a:gridCol>
@@ -23206,7 +23164,7 @@
                 </a:tc>
                 <a:extLst>
                   <a:ext uri="{0D108BD9-81ED-4DB2-BD59-A6C34878D82A}">
-                    <a16:rowId xmlns:a16="http://schemas.microsoft.com/office/drawing/2014/main" xmlns="" val="419171914"/>
+                    <a16:rowId xmlns:a16="http://schemas.microsoft.com/office/drawing/2014/main" val="419171914"/>
                   </a:ext>
                 </a:extLst>
               </a:tr>
@@ -23591,7 +23549,7 @@
                 </a:tc>
                 <a:extLst>
                   <a:ext uri="{0D108BD9-81ED-4DB2-BD59-A6C34878D82A}">
-                    <a16:rowId xmlns:a16="http://schemas.microsoft.com/office/drawing/2014/main" xmlns="" val="1434253989"/>
+                    <a16:rowId xmlns:a16="http://schemas.microsoft.com/office/drawing/2014/main" val="1434253989"/>
                   </a:ext>
                 </a:extLst>
               </a:tr>
@@ -23974,7 +23932,7 @@
                 </a:tc>
                 <a:extLst>
                   <a:ext uri="{0D108BD9-81ED-4DB2-BD59-A6C34878D82A}">
-                    <a16:rowId xmlns:a16="http://schemas.microsoft.com/office/drawing/2014/main" xmlns="" val="1123582624"/>
+                    <a16:rowId xmlns:a16="http://schemas.microsoft.com/office/drawing/2014/main" val="1123582624"/>
                   </a:ext>
                 </a:extLst>
               </a:tr>
@@ -24350,7 +24308,7 @@
                 </a:tc>
                 <a:extLst>
                   <a:ext uri="{0D108BD9-81ED-4DB2-BD59-A6C34878D82A}">
-                    <a16:rowId xmlns:a16="http://schemas.microsoft.com/office/drawing/2014/main" xmlns="" val="1194998983"/>
+                    <a16:rowId xmlns:a16="http://schemas.microsoft.com/office/drawing/2014/main" val="1194998983"/>
                   </a:ext>
                 </a:extLst>
               </a:tr>
@@ -24670,7 +24628,7 @@
                 </a:tc>
                 <a:extLst>
                   <a:ext uri="{0D108BD9-81ED-4DB2-BD59-A6C34878D82A}">
-                    <a16:rowId xmlns:a16="http://schemas.microsoft.com/office/drawing/2014/main" xmlns="" val="3886053095"/>
+                    <a16:rowId xmlns:a16="http://schemas.microsoft.com/office/drawing/2014/main" val="3886053095"/>
                   </a:ext>
                 </a:extLst>
               </a:tr>

</xml_diff>